<commit_message>
documentacion modificar planificacion del proyecto
</commit_message>
<xml_diff>
--- a/Documentation/Archivos adjuntos/Planificacion del proyecto.pptx
+++ b/Documentation/Archivos adjuntos/Planificacion del proyecto.pptx
@@ -2,10 +2,10 @@
 <file path=ppt/presentation.xml><?xml version="1.0" encoding="utf-8"?>
 <p:presentation xmlns:a="http://schemas.openxmlformats.org/drawingml/2006/main" xmlns:r="http://schemas.openxmlformats.org/officeDocument/2006/relationships" xmlns:p="http://schemas.openxmlformats.org/presentationml/2006/main" saveSubsetFonts="1">
   <p:sldMasterIdLst>
-    <p:sldMasterId id="2147483672" r:id="rId4"/>
+    <p:sldMasterId id="2147483685" r:id="rId4"/>
   </p:sldMasterIdLst>
   <p:notesMasterIdLst>
-    <p:notesMasterId r:id="rId37"/>
+    <p:notesMasterId r:id="rId35"/>
   </p:notesMasterIdLst>
   <p:sldIdLst>
     <p:sldId id="256" r:id="rId5"/>
@@ -14,32 +14,30 @@
     <p:sldId id="310" r:id="rId8"/>
     <p:sldId id="311" r:id="rId9"/>
     <p:sldId id="306" r:id="rId10"/>
-    <p:sldId id="305" r:id="rId11"/>
-    <p:sldId id="303" r:id="rId12"/>
-    <p:sldId id="321" r:id="rId13"/>
-    <p:sldId id="317" r:id="rId14"/>
-    <p:sldId id="318" r:id="rId15"/>
-    <p:sldId id="302" r:id="rId16"/>
-    <p:sldId id="322" r:id="rId17"/>
-    <p:sldId id="330" r:id="rId18"/>
-    <p:sldId id="323" r:id="rId19"/>
-    <p:sldId id="324" r:id="rId20"/>
-    <p:sldId id="325" r:id="rId21"/>
-    <p:sldId id="326" r:id="rId22"/>
-    <p:sldId id="327" r:id="rId23"/>
-    <p:sldId id="328" r:id="rId24"/>
-    <p:sldId id="329" r:id="rId25"/>
-    <p:sldId id="304" r:id="rId26"/>
-    <p:sldId id="319" r:id="rId27"/>
-    <p:sldId id="320" r:id="rId28"/>
-    <p:sldId id="301" r:id="rId29"/>
-    <p:sldId id="312" r:id="rId30"/>
-    <p:sldId id="313" r:id="rId31"/>
-    <p:sldId id="314" r:id="rId32"/>
-    <p:sldId id="315" r:id="rId33"/>
-    <p:sldId id="316" r:id="rId34"/>
-    <p:sldId id="331" r:id="rId35"/>
-    <p:sldId id="309" r:id="rId36"/>
+    <p:sldId id="303" r:id="rId11"/>
+    <p:sldId id="321" r:id="rId12"/>
+    <p:sldId id="317" r:id="rId13"/>
+    <p:sldId id="318" r:id="rId14"/>
+    <p:sldId id="302" r:id="rId15"/>
+    <p:sldId id="322" r:id="rId16"/>
+    <p:sldId id="330" r:id="rId17"/>
+    <p:sldId id="323" r:id="rId18"/>
+    <p:sldId id="324" r:id="rId19"/>
+    <p:sldId id="325" r:id="rId20"/>
+    <p:sldId id="326" r:id="rId21"/>
+    <p:sldId id="327" r:id="rId22"/>
+    <p:sldId id="328" r:id="rId23"/>
+    <p:sldId id="329" r:id="rId24"/>
+    <p:sldId id="304" r:id="rId25"/>
+    <p:sldId id="319" r:id="rId26"/>
+    <p:sldId id="320" r:id="rId27"/>
+    <p:sldId id="301" r:id="rId28"/>
+    <p:sldId id="312" r:id="rId29"/>
+    <p:sldId id="313" r:id="rId30"/>
+    <p:sldId id="314" r:id="rId31"/>
+    <p:sldId id="315" r:id="rId32"/>
+    <p:sldId id="316" r:id="rId33"/>
+    <p:sldId id="331" r:id="rId34"/>
   </p:sldIdLst>
   <p:sldSz cx="9144000" cy="6858000" type="screen4x3"/>
   <p:notesSz cx="6858000" cy="9144000"/>
@@ -2946,6 +2944,38 @@
     </pc:docChg>
   </pc:docChgLst>
   <pc:docChgLst>
+    <pc:chgData name="Alejandro León Pereira" userId="S::uo258774@uniovi.es::70ef9193-0c3a-4102-8e8d-9ffc7e994f99" providerId="AD" clId="Web-{A5BFC21F-1E59-3CCD-7760-0D8C634824F8}"/>
+    <pc:docChg chg="modSld">
+      <pc:chgData name="Alejandro León Pereira" userId="S::uo258774@uniovi.es::70ef9193-0c3a-4102-8e8d-9ffc7e994f99" providerId="AD" clId="Web-{A5BFC21F-1E59-3CCD-7760-0D8C634824F8}" dt="2021-05-03T16:45:44.154" v="8"/>
+      <pc:docMkLst>
+        <pc:docMk/>
+      </pc:docMkLst>
+      <pc:sldChg chg="addSp delSp modSp">
+        <pc:chgData name="Alejandro León Pereira" userId="S::uo258774@uniovi.es::70ef9193-0c3a-4102-8e8d-9ffc7e994f99" providerId="AD" clId="Web-{A5BFC21F-1E59-3CCD-7760-0D8C634824F8}" dt="2021-05-03T16:45:44.154" v="8"/>
+        <pc:sldMkLst>
+          <pc:docMk/>
+          <pc:sldMk cId="1881735796" sldId="307"/>
+        </pc:sldMkLst>
+        <pc:spChg chg="del">
+          <ac:chgData name="Alejandro León Pereira" userId="S::uo258774@uniovi.es::70ef9193-0c3a-4102-8e8d-9ffc7e994f99" providerId="AD" clId="Web-{A5BFC21F-1E59-3CCD-7760-0D8C634824F8}" dt="2021-05-03T16:44:27.762" v="0"/>
+          <ac:spMkLst>
+            <pc:docMk/>
+            <pc:sldMk cId="1881735796" sldId="307"/>
+            <ac:spMk id="21" creationId="{BDCFB980-D920-4828-A868-EBA664C327E5}"/>
+          </ac:spMkLst>
+        </pc:spChg>
+        <pc:graphicFrameChg chg="add del mod modGraphic">
+          <ac:chgData name="Alejandro León Pereira" userId="S::uo258774@uniovi.es::70ef9193-0c3a-4102-8e8d-9ffc7e994f99" providerId="AD" clId="Web-{A5BFC21F-1E59-3CCD-7760-0D8C634824F8}" dt="2021-05-03T16:45:44.154" v="8"/>
+          <ac:graphicFrameMkLst>
+            <pc:docMk/>
+            <pc:sldMk cId="1881735796" sldId="307"/>
+            <ac:graphicFrameMk id="4" creationId="{4B0BC2AF-1D9A-415C-A428-AD90CE34A4E3}"/>
+          </ac:graphicFrameMkLst>
+        </pc:graphicFrameChg>
+      </pc:sldChg>
+    </pc:docChg>
+  </pc:docChgLst>
+  <pc:docChgLst>
     <pc:chgData name="Jorge Gutierrez Lozano" userId="S::uo265135@uniovi.es::ac3c80da-de4e-4a07-9260-e3c20d5c83dd" providerId="AD" clId="Web-{349BB867-3FC7-46A7-97BB-0310B9120039}"/>
     <pc:docChg chg="addSld modSld">
       <pc:chgData name="Jorge Gutierrez Lozano" userId="S::uo265135@uniovi.es::ac3c80da-de4e-4a07-9260-e3c20d5c83dd" providerId="AD" clId="Web-{349BB867-3FC7-46A7-97BB-0310B9120039}" dt="2021-05-03T19:24:24.267" v="567" actId="14100"/>
@@ -3284,38 +3314,6 @@
             <ac:picMk id="4" creationId="{196BE17C-7B2E-4DAA-8FB3-BD8E5C2B70FB}"/>
           </ac:picMkLst>
         </pc:picChg>
-      </pc:sldChg>
-    </pc:docChg>
-  </pc:docChgLst>
-  <pc:docChgLst>
-    <pc:chgData name="Alejandro León Pereira" userId="S::uo258774@uniovi.es::70ef9193-0c3a-4102-8e8d-9ffc7e994f99" providerId="AD" clId="Web-{A5BFC21F-1E59-3CCD-7760-0D8C634824F8}"/>
-    <pc:docChg chg="modSld">
-      <pc:chgData name="Alejandro León Pereira" userId="S::uo258774@uniovi.es::70ef9193-0c3a-4102-8e8d-9ffc7e994f99" providerId="AD" clId="Web-{A5BFC21F-1E59-3CCD-7760-0D8C634824F8}" dt="2021-05-03T16:45:44.154" v="8"/>
-      <pc:docMkLst>
-        <pc:docMk/>
-      </pc:docMkLst>
-      <pc:sldChg chg="addSp delSp modSp">
-        <pc:chgData name="Alejandro León Pereira" userId="S::uo258774@uniovi.es::70ef9193-0c3a-4102-8e8d-9ffc7e994f99" providerId="AD" clId="Web-{A5BFC21F-1E59-3CCD-7760-0D8C634824F8}" dt="2021-05-03T16:45:44.154" v="8"/>
-        <pc:sldMkLst>
-          <pc:docMk/>
-          <pc:sldMk cId="1881735796" sldId="307"/>
-        </pc:sldMkLst>
-        <pc:spChg chg="del">
-          <ac:chgData name="Alejandro León Pereira" userId="S::uo258774@uniovi.es::70ef9193-0c3a-4102-8e8d-9ffc7e994f99" providerId="AD" clId="Web-{A5BFC21F-1E59-3CCD-7760-0D8C634824F8}" dt="2021-05-03T16:44:27.762" v="0"/>
-          <ac:spMkLst>
-            <pc:docMk/>
-            <pc:sldMk cId="1881735796" sldId="307"/>
-            <ac:spMk id="21" creationId="{BDCFB980-D920-4828-A868-EBA664C327E5}"/>
-          </ac:spMkLst>
-        </pc:spChg>
-        <pc:graphicFrameChg chg="add del mod modGraphic">
-          <ac:chgData name="Alejandro León Pereira" userId="S::uo258774@uniovi.es::70ef9193-0c3a-4102-8e8d-9ffc7e994f99" providerId="AD" clId="Web-{A5BFC21F-1E59-3CCD-7760-0D8C634824F8}" dt="2021-05-03T16:45:44.154" v="8"/>
-          <ac:graphicFrameMkLst>
-            <pc:docMk/>
-            <pc:sldMk cId="1881735796" sldId="307"/>
-            <ac:graphicFrameMk id="4" creationId="{4B0BC2AF-1D9A-415C-A428-AD90CE34A4E3}"/>
-          </ac:graphicFrameMkLst>
-        </pc:graphicFrameChg>
       </pc:sldChg>
     </pc:docChg>
   </pc:docChgLst>
@@ -3896,7 +3894,7 @@
           <a:p>
             <a:fld id="{4F9ED03F-4E6E-4B5E-B62A-11B5D60115AA}" type="slidenum">
               <a:rPr lang="es-ES" smtClean="0"/>
-              <a:t>29</a:t>
+              <a:t>28</a:t>
             </a:fld>
             <a:endParaRPr lang="es-ES"/>
           </a:p>
@@ -3986,7 +3984,7 @@
           <a:p>
             <a:fld id="{4F9ED03F-4E6E-4B5E-B62A-11B5D60115AA}" type="slidenum">
               <a:rPr lang="es-ES" smtClean="0"/>
-              <a:t>30</a:t>
+              <a:t>29</a:t>
             </a:fld>
             <a:endParaRPr lang="es-ES"/>
           </a:p>
@@ -3996,94 +3994,6 @@
     <p:extLst>
       <p:ext uri="{BB962C8B-B14F-4D97-AF65-F5344CB8AC3E}">
         <p14:creationId xmlns:p14="http://schemas.microsoft.com/office/powerpoint/2010/main" val="3788020167"/>
-      </p:ext>
-    </p:extLst>
-  </p:cSld>
-  <p:clrMapOvr>
-    <a:masterClrMapping/>
-  </p:clrMapOvr>
-</p:notes>
-</file>
-
-<file path=ppt/notesSlides/notesSlide4.xml><?xml version="1.0" encoding="utf-8"?>
-<p:notes xmlns:a="http://schemas.openxmlformats.org/drawingml/2006/main" xmlns:r="http://schemas.openxmlformats.org/officeDocument/2006/relationships" xmlns:p="http://schemas.openxmlformats.org/presentationml/2006/main">
-  <p:cSld>
-    <p:spTree>
-      <p:nvGrpSpPr>
-        <p:cNvPr id="1" name=""/>
-        <p:cNvGrpSpPr/>
-        <p:nvPr/>
-      </p:nvGrpSpPr>
-      <p:grpSpPr>
-        <a:xfrm>
-          <a:off x="0" y="0"/>
-          <a:ext cx="0" cy="0"/>
-          <a:chOff x="0" y="0"/>
-          <a:chExt cx="0" cy="0"/>
-        </a:xfrm>
-      </p:grpSpPr>
-      <p:sp>
-        <p:nvSpPr>
-          <p:cNvPr id="2" name="Marcador de imagen de diapositiva 1"/>
-          <p:cNvSpPr>
-            <a:spLocks noGrp="1" noRot="1" noChangeAspect="1"/>
-          </p:cNvSpPr>
-          <p:nvPr>
-            <p:ph type="sldImg"/>
-          </p:nvPr>
-        </p:nvSpPr>
-        <p:spPr/>
-      </p:sp>
-      <p:sp>
-        <p:nvSpPr>
-          <p:cNvPr id="3" name="Marcador de notas 2"/>
-          <p:cNvSpPr>
-            <a:spLocks noGrp="1"/>
-          </p:cNvSpPr>
-          <p:nvPr>
-            <p:ph type="body" idx="1"/>
-          </p:nvPr>
-        </p:nvSpPr>
-        <p:spPr/>
-        <p:txBody>
-          <a:bodyPr/>
-          <a:lstStyle/>
-          <a:p>
-            <a:r>
-              <a:rPr lang="es-ES"/>
-              <a:t>Con esto concluye la presentación, muchas gracias, y si ha quedado alguna duda estamos abiertos a posibles preguntas.</a:t>
-            </a:r>
-            <a:endParaRPr lang="en-GB"/>
-          </a:p>
-        </p:txBody>
-      </p:sp>
-      <p:sp>
-        <p:nvSpPr>
-          <p:cNvPr id="4" name="Marcador de número de diapositiva 3"/>
-          <p:cNvSpPr>
-            <a:spLocks noGrp="1"/>
-          </p:cNvSpPr>
-          <p:nvPr>
-            <p:ph type="sldNum" sz="quarter" idx="5"/>
-          </p:nvPr>
-        </p:nvSpPr>
-        <p:spPr/>
-        <p:txBody>
-          <a:bodyPr/>
-          <a:lstStyle/>
-          <a:p>
-            <a:fld id="{4F9ED03F-4E6E-4B5E-B62A-11B5D60115AA}" type="slidenum">
-              <a:rPr lang="es-ES" smtClean="0"/>
-              <a:t>32</a:t>
-            </a:fld>
-            <a:endParaRPr lang="es-ES"/>
-          </a:p>
-        </p:txBody>
-      </p:sp>
-    </p:spTree>
-    <p:extLst>
-      <p:ext uri="{BB962C8B-B14F-4D97-AF65-F5344CB8AC3E}">
-        <p14:creationId xmlns:p14="http://schemas.microsoft.com/office/powerpoint/2010/main" val="3818785097"/>
       </p:ext>
     </p:extLst>
   </p:cSld>
@@ -4373,7 +4283,7 @@
     </p:spTree>
     <p:extLst>
       <p:ext uri="{BB962C8B-B14F-4D97-AF65-F5344CB8AC3E}">
-        <p14:creationId xmlns:p14="http://schemas.microsoft.com/office/powerpoint/2010/main" val="3966226154"/>
+        <p14:creationId xmlns:p14="http://schemas.microsoft.com/office/powerpoint/2010/main" val="1439180159"/>
       </p:ext>
     </p:extLst>
   </p:cSld>
@@ -4543,7 +4453,7 @@
     </p:spTree>
     <p:extLst>
       <p:ext uri="{BB962C8B-B14F-4D97-AF65-F5344CB8AC3E}">
-        <p14:creationId xmlns:p14="http://schemas.microsoft.com/office/powerpoint/2010/main" val="2350345596"/>
+        <p14:creationId xmlns:p14="http://schemas.microsoft.com/office/powerpoint/2010/main" val="2525301617"/>
       </p:ext>
     </p:extLst>
   </p:cSld>
@@ -4723,416 +4633,7 @@
     </p:spTree>
     <p:extLst>
       <p:ext uri="{BB962C8B-B14F-4D97-AF65-F5344CB8AC3E}">
-        <p14:creationId xmlns:p14="http://schemas.microsoft.com/office/powerpoint/2010/main" val="4100093015"/>
-      </p:ext>
-    </p:extLst>
-  </p:cSld>
-  <p:clrMapOvr>
-    <a:masterClrMapping/>
-  </p:clrMapOvr>
-</p:sldLayout>
-</file>
-
-<file path=ppt/slideLayouts/slideLayout12.xml><?xml version="1.0" encoding="utf-8"?>
-<p:sldLayout xmlns:a="http://schemas.openxmlformats.org/drawingml/2006/main" xmlns:r="http://schemas.openxmlformats.org/officeDocument/2006/relationships" xmlns:p="http://schemas.openxmlformats.org/presentationml/2006/main" type="twoTxTwoObj">
-  <p:cSld name="1_Comparación">
-    <p:spTree>
-      <p:nvGrpSpPr>
-        <p:cNvPr id="1" name=""/>
-        <p:cNvGrpSpPr/>
-        <p:nvPr/>
-      </p:nvGrpSpPr>
-      <p:grpSpPr>
-        <a:xfrm>
-          <a:off x="0" y="0"/>
-          <a:ext cx="0" cy="0"/>
-          <a:chOff x="0" y="0"/>
-          <a:chExt cx="0" cy="0"/>
-        </a:xfrm>
-      </p:grpSpPr>
-      <p:sp>
-        <p:nvSpPr>
-          <p:cNvPr id="2" name="1 Título"/>
-          <p:cNvSpPr>
-            <a:spLocks noGrp="1"/>
-          </p:cNvSpPr>
-          <p:nvPr>
-            <p:ph type="title"/>
-          </p:nvPr>
-        </p:nvSpPr>
-        <p:spPr>
-          <a:xfrm>
-            <a:off x="381000" y="1143000"/>
-            <a:ext cx="8382000" cy="1069848"/>
-          </a:xfrm>
-        </p:spPr>
-        <p:txBody>
-          <a:bodyPr anchor="ctr"/>
-          <a:lstStyle>
-            <a:lvl1pPr>
-              <a:defRPr sz="4000" b="0" i="0" cap="none" baseline="0"/>
-            </a:lvl1pPr>
-          </a:lstStyle>
-          <a:p>
-            <a:r>
-              <a:rPr kumimoji="0" lang="es-ES"/>
-              <a:t>Haga clic para modificar el estilo de título del patrón</a:t>
-            </a:r>
-            <a:endParaRPr kumimoji="0" lang="en-US"/>
-          </a:p>
-        </p:txBody>
-      </p:sp>
-      <p:sp>
-        <p:nvSpPr>
-          <p:cNvPr id="3" name="2 Marcador de texto"/>
-          <p:cNvSpPr>
-            <a:spLocks noGrp="1"/>
-          </p:cNvSpPr>
-          <p:nvPr>
-            <p:ph type="body" idx="1"/>
-          </p:nvPr>
-        </p:nvSpPr>
-        <p:spPr>
-          <a:xfrm>
-            <a:off x="381000" y="2244970"/>
-            <a:ext cx="4041648" cy="457200"/>
-          </a:xfrm>
-          <a:solidFill>
-            <a:schemeClr val="accent2">
-              <a:satMod val="150000"/>
-              <a:alpha val="25000"/>
-            </a:schemeClr>
-          </a:solidFill>
-          <a:ln w="12700">
-            <a:solidFill>
-              <a:schemeClr val="accent2"/>
-            </a:solidFill>
-          </a:ln>
-        </p:spPr>
-        <p:txBody>
-          <a:bodyPr anchor="ctr">
-            <a:noAutofit/>
-          </a:bodyPr>
-          <a:lstStyle>
-            <a:lvl1pPr marL="45720" indent="0">
-              <a:buNone/>
-              <a:defRPr sz="1900" b="1">
-                <a:solidFill>
-                  <a:schemeClr val="tx1">
-                    <a:tint val="95000"/>
-                  </a:schemeClr>
-                </a:solidFill>
-              </a:defRPr>
-            </a:lvl1pPr>
-            <a:lvl2pPr>
-              <a:buNone/>
-              <a:defRPr sz="2000" b="1"/>
-            </a:lvl2pPr>
-            <a:lvl3pPr>
-              <a:buNone/>
-              <a:defRPr sz="1800" b="1"/>
-            </a:lvl3pPr>
-            <a:lvl4pPr>
-              <a:buNone/>
-              <a:defRPr sz="1600" b="1"/>
-            </a:lvl4pPr>
-            <a:lvl5pPr>
-              <a:buNone/>
-              <a:defRPr sz="1600" b="1"/>
-            </a:lvl5pPr>
-          </a:lstStyle>
-          <a:p>
-            <a:pPr lvl="0" eaLnBrk="1" latinLnBrk="0" hangingPunct="1"/>
-            <a:r>
-              <a:rPr kumimoji="0" lang="es-ES"/>
-              <a:t>Haga clic para modificar el estilo de texto del patrón</a:t>
-            </a:r>
-          </a:p>
-        </p:txBody>
-      </p:sp>
-      <p:sp>
-        <p:nvSpPr>
-          <p:cNvPr id="4" name="3 Marcador de texto"/>
-          <p:cNvSpPr>
-            <a:spLocks noGrp="1"/>
-          </p:cNvSpPr>
-          <p:nvPr>
-            <p:ph type="body" sz="half" idx="3"/>
-          </p:nvPr>
-        </p:nvSpPr>
-        <p:spPr>
-          <a:xfrm>
-            <a:off x="4721225" y="2244970"/>
-            <a:ext cx="4041775" cy="457200"/>
-          </a:xfrm>
-          <a:solidFill>
-            <a:schemeClr val="accent2">
-              <a:satMod val="150000"/>
-              <a:alpha val="25000"/>
-            </a:schemeClr>
-          </a:solidFill>
-          <a:ln w="12700">
-            <a:solidFill>
-              <a:schemeClr val="accent2"/>
-            </a:solidFill>
-          </a:ln>
-        </p:spPr>
-        <p:txBody>
-          <a:bodyPr anchor="ctr">
-            <a:noAutofit/>
-          </a:bodyPr>
-          <a:lstStyle>
-            <a:lvl1pPr marL="45720" indent="0">
-              <a:buNone/>
-              <a:defRPr sz="1900" b="1">
-                <a:solidFill>
-                  <a:schemeClr val="tx1">
-                    <a:tint val="95000"/>
-                  </a:schemeClr>
-                </a:solidFill>
-              </a:defRPr>
-            </a:lvl1pPr>
-            <a:lvl2pPr>
-              <a:buNone/>
-              <a:defRPr sz="2000" b="1"/>
-            </a:lvl2pPr>
-            <a:lvl3pPr>
-              <a:buNone/>
-              <a:defRPr sz="1800" b="1"/>
-            </a:lvl3pPr>
-            <a:lvl4pPr>
-              <a:buNone/>
-              <a:defRPr sz="1600" b="1"/>
-            </a:lvl4pPr>
-            <a:lvl5pPr>
-              <a:buNone/>
-              <a:defRPr sz="1600" b="1"/>
-            </a:lvl5pPr>
-          </a:lstStyle>
-          <a:p>
-            <a:pPr lvl="0" eaLnBrk="1" latinLnBrk="0" hangingPunct="1"/>
-            <a:r>
-              <a:rPr kumimoji="0" lang="es-ES"/>
-              <a:t>Haga clic para modificar el estilo de texto del patrón</a:t>
-            </a:r>
-          </a:p>
-        </p:txBody>
-      </p:sp>
-      <p:sp>
-        <p:nvSpPr>
-          <p:cNvPr id="5" name="4 Marcador de contenido"/>
-          <p:cNvSpPr>
-            <a:spLocks noGrp="1"/>
-          </p:cNvSpPr>
-          <p:nvPr>
-            <p:ph sz="quarter" idx="2"/>
-          </p:nvPr>
-        </p:nvSpPr>
-        <p:spPr>
-          <a:xfrm>
-            <a:off x="381000" y="2708519"/>
-            <a:ext cx="4041648" cy="3886200"/>
-          </a:xfrm>
-        </p:spPr>
-        <p:txBody>
-          <a:bodyPr/>
-          <a:lstStyle>
-            <a:lvl1pPr>
-              <a:defRPr sz="2000"/>
-            </a:lvl1pPr>
-            <a:lvl2pPr>
-              <a:defRPr sz="2000"/>
-            </a:lvl2pPr>
-            <a:lvl3pPr>
-              <a:defRPr sz="1800"/>
-            </a:lvl3pPr>
-            <a:lvl4pPr>
-              <a:defRPr sz="1600"/>
-            </a:lvl4pPr>
-            <a:lvl5pPr>
-              <a:defRPr sz="1600"/>
-            </a:lvl5pPr>
-          </a:lstStyle>
-          <a:p>
-            <a:pPr lvl="0" eaLnBrk="1" latinLnBrk="0" hangingPunct="1"/>
-            <a:r>
-              <a:rPr lang="es-ES"/>
-              <a:t>Haga clic para modificar el estilo de texto del patrón</a:t>
-            </a:r>
-          </a:p>
-          <a:p>
-            <a:pPr lvl="1" eaLnBrk="1" latinLnBrk="0" hangingPunct="1"/>
-            <a:r>
-              <a:rPr lang="es-ES"/>
-              <a:t>Segundo nivel</a:t>
-            </a:r>
-          </a:p>
-          <a:p>
-            <a:pPr lvl="2" eaLnBrk="1" latinLnBrk="0" hangingPunct="1"/>
-            <a:r>
-              <a:rPr lang="es-ES"/>
-              <a:t>Tercer nivel</a:t>
-            </a:r>
-          </a:p>
-          <a:p>
-            <a:pPr lvl="3" eaLnBrk="1" latinLnBrk="0" hangingPunct="1"/>
-            <a:r>
-              <a:rPr lang="es-ES"/>
-              <a:t>Cuarto nivel</a:t>
-            </a:r>
-          </a:p>
-          <a:p>
-            <a:pPr lvl="4" eaLnBrk="1" latinLnBrk="0" hangingPunct="1"/>
-            <a:r>
-              <a:rPr lang="es-ES"/>
-              <a:t>Quinto nivel</a:t>
-            </a:r>
-            <a:endParaRPr kumimoji="0" lang="en-US"/>
-          </a:p>
-        </p:txBody>
-      </p:sp>
-      <p:sp>
-        <p:nvSpPr>
-          <p:cNvPr id="6" name="5 Marcador de contenido"/>
-          <p:cNvSpPr>
-            <a:spLocks noGrp="1"/>
-          </p:cNvSpPr>
-          <p:nvPr>
-            <p:ph sz="quarter" idx="4"/>
-          </p:nvPr>
-        </p:nvSpPr>
-        <p:spPr>
-          <a:xfrm>
-            <a:off x="4718304" y="2708519"/>
-            <a:ext cx="4041775" cy="3886200"/>
-          </a:xfrm>
-        </p:spPr>
-        <p:txBody>
-          <a:bodyPr/>
-          <a:lstStyle>
-            <a:lvl1pPr>
-              <a:defRPr sz="2000"/>
-            </a:lvl1pPr>
-            <a:lvl2pPr>
-              <a:defRPr sz="2000"/>
-            </a:lvl2pPr>
-            <a:lvl3pPr>
-              <a:defRPr sz="1800"/>
-            </a:lvl3pPr>
-            <a:lvl4pPr>
-              <a:defRPr sz="1600"/>
-            </a:lvl4pPr>
-            <a:lvl5pPr>
-              <a:defRPr sz="1600"/>
-            </a:lvl5pPr>
-          </a:lstStyle>
-          <a:p>
-            <a:pPr lvl="0" eaLnBrk="1" latinLnBrk="0" hangingPunct="1"/>
-            <a:r>
-              <a:rPr lang="es-ES"/>
-              <a:t>Haga clic para modificar el estilo de texto del patrón</a:t>
-            </a:r>
-          </a:p>
-          <a:p>
-            <a:pPr lvl="1" eaLnBrk="1" latinLnBrk="0" hangingPunct="1"/>
-            <a:r>
-              <a:rPr lang="es-ES"/>
-              <a:t>Segundo nivel</a:t>
-            </a:r>
-          </a:p>
-          <a:p>
-            <a:pPr lvl="2" eaLnBrk="1" latinLnBrk="0" hangingPunct="1"/>
-            <a:r>
-              <a:rPr lang="es-ES"/>
-              <a:t>Tercer nivel</a:t>
-            </a:r>
-          </a:p>
-          <a:p>
-            <a:pPr lvl="3" eaLnBrk="1" latinLnBrk="0" hangingPunct="1"/>
-            <a:r>
-              <a:rPr lang="es-ES"/>
-              <a:t>Cuarto nivel</a:t>
-            </a:r>
-          </a:p>
-          <a:p>
-            <a:pPr lvl="4" eaLnBrk="1" latinLnBrk="0" hangingPunct="1"/>
-            <a:r>
-              <a:rPr lang="es-ES"/>
-              <a:t>Quinto nivel</a:t>
-            </a:r>
-            <a:endParaRPr kumimoji="0" lang="en-US"/>
-          </a:p>
-        </p:txBody>
-      </p:sp>
-      <p:sp>
-        <p:nvSpPr>
-          <p:cNvPr id="26" name="25 Marcador de fecha"/>
-          <p:cNvSpPr>
-            <a:spLocks noGrp="1"/>
-          </p:cNvSpPr>
-          <p:nvPr>
-            <p:ph type="dt" sz="half" idx="10"/>
-          </p:nvPr>
-        </p:nvSpPr>
-        <p:spPr/>
-        <p:txBody>
-          <a:bodyPr rtlCol="0"/>
-          <a:lstStyle/>
-          <a:p>
-            <a:fld id="{7A847CFC-816F-41D0-AAC0-9BF4FEBC753E}" type="datetimeFigureOut">
-              <a:rPr lang="es-ES" smtClean="0"/>
-              <a:t>02/11/2021</a:t>
-            </a:fld>
-            <a:endParaRPr lang="es-ES"/>
-          </a:p>
-        </p:txBody>
-      </p:sp>
-      <p:sp>
-        <p:nvSpPr>
-          <p:cNvPr id="27" name="26 Marcador de número de diapositiva"/>
-          <p:cNvSpPr>
-            <a:spLocks noGrp="1"/>
-          </p:cNvSpPr>
-          <p:nvPr>
-            <p:ph type="sldNum" sz="quarter" idx="11"/>
-          </p:nvPr>
-        </p:nvSpPr>
-        <p:spPr/>
-        <p:txBody>
-          <a:bodyPr rtlCol="0"/>
-          <a:lstStyle/>
-          <a:p>
-            <a:fld id="{132FADFE-3B8F-471C-ABF0-DBC7717ECBBC}" type="slidenum">
-              <a:rPr lang="es-ES" smtClean="0"/>
-              <a:t>‹Nº›</a:t>
-            </a:fld>
-            <a:endParaRPr lang="es-ES"/>
-          </a:p>
-        </p:txBody>
-      </p:sp>
-      <p:sp>
-        <p:nvSpPr>
-          <p:cNvPr id="28" name="27 Marcador de pie de página"/>
-          <p:cNvSpPr>
-            <a:spLocks noGrp="1"/>
-          </p:cNvSpPr>
-          <p:nvPr>
-            <p:ph type="ftr" sz="quarter" idx="12"/>
-          </p:nvPr>
-        </p:nvSpPr>
-        <p:spPr/>
-        <p:txBody>
-          <a:bodyPr rtlCol="0"/>
-          <a:lstStyle/>
-          <a:p>
-            <a:endParaRPr lang="es-ES"/>
-          </a:p>
-        </p:txBody>
-      </p:sp>
-    </p:spTree>
-    <p:extLst>
-      <p:ext uri="{BB962C8B-B14F-4D97-AF65-F5344CB8AC3E}">
-        <p14:creationId xmlns:p14="http://schemas.microsoft.com/office/powerpoint/2010/main" val="1798555933"/>
+        <p14:creationId xmlns:p14="http://schemas.microsoft.com/office/powerpoint/2010/main" val="1526464127"/>
       </p:ext>
     </p:extLst>
   </p:cSld>
@@ -5302,7 +4803,7 @@
     </p:spTree>
     <p:extLst>
       <p:ext uri="{BB962C8B-B14F-4D97-AF65-F5344CB8AC3E}">
-        <p14:creationId xmlns:p14="http://schemas.microsoft.com/office/powerpoint/2010/main" val="1894244161"/>
+        <p14:creationId xmlns:p14="http://schemas.microsoft.com/office/powerpoint/2010/main" val="1850938993"/>
       </p:ext>
     </p:extLst>
   </p:cSld>
@@ -5594,7 +5095,7 @@
     </p:spTree>
     <p:extLst>
       <p:ext uri="{BB962C8B-B14F-4D97-AF65-F5344CB8AC3E}">
-        <p14:creationId xmlns:p14="http://schemas.microsoft.com/office/powerpoint/2010/main" val="2193750375"/>
+        <p14:creationId xmlns:p14="http://schemas.microsoft.com/office/powerpoint/2010/main" val="2915214879"/>
       </p:ext>
     </p:extLst>
   </p:cSld>
@@ -5882,7 +5383,7 @@
     </p:spTree>
     <p:extLst>
       <p:ext uri="{BB962C8B-B14F-4D97-AF65-F5344CB8AC3E}">
-        <p14:creationId xmlns:p14="http://schemas.microsoft.com/office/powerpoint/2010/main" val="1217246359"/>
+        <p14:creationId xmlns:p14="http://schemas.microsoft.com/office/powerpoint/2010/main" val="3837353052"/>
       </p:ext>
     </p:extLst>
   </p:cSld>
@@ -6302,7 +5803,7 @@
     </p:spTree>
     <p:extLst>
       <p:ext uri="{BB962C8B-B14F-4D97-AF65-F5344CB8AC3E}">
-        <p14:creationId xmlns:p14="http://schemas.microsoft.com/office/powerpoint/2010/main" val="1863564890"/>
+        <p14:creationId xmlns:p14="http://schemas.microsoft.com/office/powerpoint/2010/main" val="3604453427"/>
       </p:ext>
     </p:extLst>
   </p:cSld>
@@ -6420,7 +5921,7 @@
     </p:spTree>
     <p:extLst>
       <p:ext uri="{BB962C8B-B14F-4D97-AF65-F5344CB8AC3E}">
-        <p14:creationId xmlns:p14="http://schemas.microsoft.com/office/powerpoint/2010/main" val="1763971292"/>
+        <p14:creationId xmlns:p14="http://schemas.microsoft.com/office/powerpoint/2010/main" val="1816035197"/>
       </p:ext>
     </p:extLst>
   </p:cSld>
@@ -6515,7 +6016,7 @@
     </p:spTree>
     <p:extLst>
       <p:ext uri="{BB962C8B-B14F-4D97-AF65-F5344CB8AC3E}">
-        <p14:creationId xmlns:p14="http://schemas.microsoft.com/office/powerpoint/2010/main" val="2757061709"/>
+        <p14:creationId xmlns:p14="http://schemas.microsoft.com/office/powerpoint/2010/main" val="649419475"/>
       </p:ext>
     </p:extLst>
   </p:cSld>
@@ -6802,7 +6303,7 @@
     </p:spTree>
     <p:extLst>
       <p:ext uri="{BB962C8B-B14F-4D97-AF65-F5344CB8AC3E}">
-        <p14:creationId xmlns:p14="http://schemas.microsoft.com/office/powerpoint/2010/main" val="2579705261"/>
+        <p14:creationId xmlns:p14="http://schemas.microsoft.com/office/powerpoint/2010/main" val="71380752"/>
       </p:ext>
     </p:extLst>
   </p:cSld>
@@ -7124,7 +6625,7 @@
     </p:spTree>
     <p:extLst>
       <p:ext uri="{BB962C8B-B14F-4D97-AF65-F5344CB8AC3E}">
-        <p14:creationId xmlns:p14="http://schemas.microsoft.com/office/powerpoint/2010/main" val="1242981097"/>
+        <p14:creationId xmlns:p14="http://schemas.microsoft.com/office/powerpoint/2010/main" val="1000158786"/>
       </p:ext>
     </p:extLst>
   </p:cSld>
@@ -7420,7 +6921,7 @@
           <p:cNvPr id="8" name="1 CuadroTexto">
             <a:extLst>
               <a:ext uri="{FF2B5EF4-FFF2-40B4-BE49-F238E27FC236}">
-                <a16:creationId xmlns:a16="http://schemas.microsoft.com/office/drawing/2014/main" id="{BBB7BD0E-8105-4BFB-AE8B-CAE5568D48B3}"/>
+                <a16:creationId xmlns:a16="http://schemas.microsoft.com/office/drawing/2014/main" id="{B2C7E1D8-343B-443E-91F3-517F93AB803D}"/>
               </a:ext>
             </a:extLst>
           </p:cNvPr>
@@ -7459,7 +6960,7 @@
           <p:cNvPr id="9" name="3 CuadroTexto">
             <a:extLst>
               <a:ext uri="{FF2B5EF4-FFF2-40B4-BE49-F238E27FC236}">
-                <a16:creationId xmlns:a16="http://schemas.microsoft.com/office/drawing/2014/main" id="{5829A72C-1ED0-4456-9254-3BE019AA1176}"/>
+                <a16:creationId xmlns:a16="http://schemas.microsoft.com/office/drawing/2014/main" id="{D6DD7B15-5F5F-4EDE-B43D-C7F0FE6FEFCF}"/>
               </a:ext>
             </a:extLst>
           </p:cNvPr>
@@ -7498,24 +6999,23 @@
     </p:spTree>
     <p:extLst>
       <p:ext uri="{BB962C8B-B14F-4D97-AF65-F5344CB8AC3E}">
-        <p14:creationId xmlns:p14="http://schemas.microsoft.com/office/powerpoint/2010/main" val="3259657700"/>
+        <p14:creationId xmlns:p14="http://schemas.microsoft.com/office/powerpoint/2010/main" val="1598555168"/>
       </p:ext>
     </p:extLst>
   </p:cSld>
   <p:clrMap bg1="lt1" tx1="dk1" bg2="lt2" tx2="dk2" accent1="accent1" accent2="accent2" accent3="accent3" accent4="accent4" accent5="accent5" accent6="accent6" hlink="hlink" folHlink="folHlink"/>
   <p:sldLayoutIdLst>
-    <p:sldLayoutId id="2147483673" r:id="rId1"/>
-    <p:sldLayoutId id="2147483674" r:id="rId2"/>
-    <p:sldLayoutId id="2147483675" r:id="rId3"/>
-    <p:sldLayoutId id="2147483676" r:id="rId4"/>
-    <p:sldLayoutId id="2147483677" r:id="rId5"/>
-    <p:sldLayoutId id="2147483678" r:id="rId6"/>
-    <p:sldLayoutId id="2147483679" r:id="rId7"/>
-    <p:sldLayoutId id="2147483680" r:id="rId8"/>
-    <p:sldLayoutId id="2147483681" r:id="rId9"/>
-    <p:sldLayoutId id="2147483682" r:id="rId10"/>
-    <p:sldLayoutId id="2147483683" r:id="rId11"/>
-    <p:sldLayoutId id="2147483684" r:id="rId12"/>
+    <p:sldLayoutId id="2147483686" r:id="rId1"/>
+    <p:sldLayoutId id="2147483687" r:id="rId2"/>
+    <p:sldLayoutId id="2147483688" r:id="rId3"/>
+    <p:sldLayoutId id="2147483689" r:id="rId4"/>
+    <p:sldLayoutId id="2147483690" r:id="rId5"/>
+    <p:sldLayoutId id="2147483691" r:id="rId6"/>
+    <p:sldLayoutId id="2147483692" r:id="rId7"/>
+    <p:sldLayoutId id="2147483693" r:id="rId8"/>
+    <p:sldLayoutId id="2147483694" r:id="rId9"/>
+    <p:sldLayoutId id="2147483695" r:id="rId10"/>
+    <p:sldLayoutId id="2147483696" r:id="rId11"/>
   </p:sldLayoutIdLst>
   <p:txStyles>
     <p:titleStyle>
@@ -8242,535 +7742,6 @@
           </a:p>
         </p:txBody>
       </p:sp>
-      <p:pic>
-        <p:nvPicPr>
-          <p:cNvPr id="3" name="Picture 3" descr="Table&#10;&#10;Description automatically generated">
-            <a:extLst>
-              <a:ext uri="{FF2B5EF4-FFF2-40B4-BE49-F238E27FC236}">
-                <a16:creationId xmlns:a16="http://schemas.microsoft.com/office/drawing/2014/main" id="{3DA14B81-EA70-4208-A391-EA585D80F152}"/>
-              </a:ext>
-            </a:extLst>
-          </p:cNvPr>
-          <p:cNvPicPr>
-            <a:picLocks noChangeAspect="1"/>
-          </p:cNvPicPr>
-          <p:nvPr/>
-        </p:nvPicPr>
-        <p:blipFill>
-          <a:blip r:embed="rId2"/>
-          <a:stretch>
-            <a:fillRect/>
-          </a:stretch>
-        </p:blipFill>
-        <p:spPr>
-          <a:xfrm>
-            <a:off x="573771" y="1795297"/>
-            <a:ext cx="7390895" cy="1344745"/>
-          </a:xfrm>
-          <a:prstGeom prst="rect">
-            <a:avLst/>
-          </a:prstGeom>
-        </p:spPr>
-      </p:pic>
-      <p:sp>
-        <p:nvSpPr>
-          <p:cNvPr id="6" name="Arrow: Pentagon 5">
-            <a:extLst>
-              <a:ext uri="{FF2B5EF4-FFF2-40B4-BE49-F238E27FC236}">
-                <a16:creationId xmlns:a16="http://schemas.microsoft.com/office/drawing/2014/main" id="{EE69D3DE-39AC-40FA-AD23-BA18F0EDE0D4}"/>
-              </a:ext>
-            </a:extLst>
-          </p:cNvPr>
-          <p:cNvSpPr/>
-          <p:nvPr/>
-        </p:nvSpPr>
-        <p:spPr>
-          <a:xfrm>
-            <a:off x="697321" y="3283195"/>
-            <a:ext cx="2550932" cy="1173276"/>
-          </a:xfrm>
-          <a:prstGeom prst="homePlate">
-            <a:avLst/>
-          </a:prstGeom>
-        </p:spPr>
-        <p:style>
-          <a:lnRef idx="1">
-            <a:schemeClr val="accent2"/>
-          </a:lnRef>
-          <a:fillRef idx="2">
-            <a:schemeClr val="accent2"/>
-          </a:fillRef>
-          <a:effectRef idx="1">
-            <a:schemeClr val="accent2"/>
-          </a:effectRef>
-          <a:fontRef idx="minor">
-            <a:schemeClr val="dk1"/>
-          </a:fontRef>
-        </p:style>
-        <p:txBody>
-          <a:bodyPr rtlCol="0" anchor="ctr"/>
-          <a:lstStyle/>
-          <a:p>
-            <a:pPr algn="ctr"/>
-            <a:r>
-              <a:rPr lang="en-US"/>
-              <a:t>Se </a:t>
-            </a:r>
-            <a:r>
-              <a:rPr lang="en-US" err="1"/>
-              <a:t>escogen</a:t>
-            </a:r>
-            <a:r>
-              <a:rPr lang="en-US"/>
-              <a:t> el </a:t>
-            </a:r>
-            <a:r>
-              <a:rPr lang="en-US" err="1"/>
-              <a:t>módulo</a:t>
-            </a:r>
-            <a:r>
-              <a:rPr lang="en-US"/>
-              <a:t> con mayor y </a:t>
-            </a:r>
-            <a:r>
-              <a:rPr lang="en-US" err="1"/>
-              <a:t>menor</a:t>
-            </a:r>
-            <a:r>
-              <a:rPr lang="en-US"/>
-              <a:t> valor de PF </a:t>
-            </a:r>
-            <a:r>
-              <a:rPr lang="en-US" err="1"/>
-              <a:t>respectivamente</a:t>
-            </a:r>
-          </a:p>
-        </p:txBody>
-      </p:sp>
-      <p:sp>
-        <p:nvSpPr>
-          <p:cNvPr id="7" name="Arrow: Pentagon 6">
-            <a:extLst>
-              <a:ext uri="{FF2B5EF4-FFF2-40B4-BE49-F238E27FC236}">
-                <a16:creationId xmlns:a16="http://schemas.microsoft.com/office/drawing/2014/main" id="{5C292F65-4ABD-41C9-9CDF-4EA93FF8B12F}"/>
-              </a:ext>
-            </a:extLst>
-          </p:cNvPr>
-          <p:cNvSpPr/>
-          <p:nvPr/>
-        </p:nvSpPr>
-        <p:spPr>
-          <a:xfrm>
-            <a:off x="4671327" y="3283195"/>
-            <a:ext cx="2550932" cy="1173276"/>
-          </a:xfrm>
-          <a:prstGeom prst="homePlate">
-            <a:avLst/>
-          </a:prstGeom>
-        </p:spPr>
-        <p:style>
-          <a:lnRef idx="1">
-            <a:schemeClr val="accent2"/>
-          </a:lnRef>
-          <a:fillRef idx="2">
-            <a:schemeClr val="accent2"/>
-          </a:fillRef>
-          <a:effectRef idx="1">
-            <a:schemeClr val="accent2"/>
-          </a:effectRef>
-          <a:fontRef idx="minor">
-            <a:schemeClr val="dk1"/>
-          </a:fontRef>
-        </p:style>
-        <p:txBody>
-          <a:bodyPr lIns="91440" tIns="45720" rIns="91440" bIns="45720" rtlCol="0" anchor="ctr"/>
-          <a:lstStyle/>
-          <a:p>
-            <a:pPr algn="ctr"/>
-            <a:r>
-              <a:rPr lang="en-US"/>
-              <a:t>Como </a:t>
-            </a:r>
-            <a:r>
-              <a:rPr lang="en-US" err="1"/>
-              <a:t>grupo</a:t>
-            </a:r>
-            <a:r>
-              <a:rPr lang="en-US"/>
-              <a:t> de </a:t>
-            </a:r>
-            <a:r>
-              <a:rPr lang="en-US" err="1"/>
-              <a:t>expertos</a:t>
-            </a:r>
-            <a:r>
-              <a:rPr lang="en-US"/>
-              <a:t> </a:t>
-            </a:r>
-            <a:r>
-              <a:rPr lang="en-US" err="1"/>
-              <a:t>estimamos</a:t>
-            </a:r>
-            <a:r>
-              <a:rPr lang="en-US"/>
-              <a:t> en días la </a:t>
-            </a:r>
-            <a:r>
-              <a:rPr lang="en-US" err="1"/>
-              <a:t>duración</a:t>
-            </a:r>
-            <a:r>
-              <a:rPr lang="en-US"/>
-              <a:t> del desarrollo</a:t>
-            </a:r>
-          </a:p>
-        </p:txBody>
-      </p:sp>
-      <p:sp>
-        <p:nvSpPr>
-          <p:cNvPr id="8" name="Arrow: Right 7">
-            <a:extLst>
-              <a:ext uri="{FF2B5EF4-FFF2-40B4-BE49-F238E27FC236}">
-                <a16:creationId xmlns:a16="http://schemas.microsoft.com/office/drawing/2014/main" id="{D426F41F-0C26-4255-90E7-57572081BADD}"/>
-              </a:ext>
-            </a:extLst>
-          </p:cNvPr>
-          <p:cNvSpPr/>
-          <p:nvPr/>
-        </p:nvSpPr>
-        <p:spPr>
-          <a:xfrm>
-            <a:off x="3497103" y="3630448"/>
-            <a:ext cx="976470" cy="484450"/>
-          </a:xfrm>
-          <a:prstGeom prst="rightArrow">
-            <a:avLst/>
-          </a:prstGeom>
-        </p:spPr>
-        <p:style>
-          <a:lnRef idx="2">
-            <a:schemeClr val="accent2">
-              <a:shade val="50000"/>
-            </a:schemeClr>
-          </a:lnRef>
-          <a:fillRef idx="1">
-            <a:schemeClr val="accent2"/>
-          </a:fillRef>
-          <a:effectRef idx="0">
-            <a:schemeClr val="accent2"/>
-          </a:effectRef>
-          <a:fontRef idx="minor">
-            <a:schemeClr val="lt1"/>
-          </a:fontRef>
-        </p:style>
-        <p:txBody>
-          <a:bodyPr rtlCol="0" anchor="ctr"/>
-          <a:lstStyle/>
-          <a:p>
-            <a:pPr algn="ctr"/>
-            <a:endParaRPr lang="en-US"/>
-          </a:p>
-        </p:txBody>
-      </p:sp>
-      <p:sp>
-        <p:nvSpPr>
-          <p:cNvPr id="9" name="Arrow: Down 8">
-            <a:extLst>
-              <a:ext uri="{FF2B5EF4-FFF2-40B4-BE49-F238E27FC236}">
-                <a16:creationId xmlns:a16="http://schemas.microsoft.com/office/drawing/2014/main" id="{51550E1D-E0AB-4814-8CE3-7AD29631A4C3}"/>
-              </a:ext>
-            </a:extLst>
-          </p:cNvPr>
-          <p:cNvSpPr/>
-          <p:nvPr/>
-        </p:nvSpPr>
-        <p:spPr>
-          <a:xfrm>
-            <a:off x="5658137" y="4540753"/>
-            <a:ext cx="431464" cy="900775"/>
-          </a:xfrm>
-          <a:prstGeom prst="downArrow">
-            <a:avLst/>
-          </a:prstGeom>
-        </p:spPr>
-        <p:style>
-          <a:lnRef idx="2">
-            <a:schemeClr val="accent2">
-              <a:shade val="50000"/>
-            </a:schemeClr>
-          </a:lnRef>
-          <a:fillRef idx="1">
-            <a:schemeClr val="accent2"/>
-          </a:fillRef>
-          <a:effectRef idx="0">
-            <a:schemeClr val="accent2"/>
-          </a:effectRef>
-          <a:fontRef idx="minor">
-            <a:schemeClr val="lt1"/>
-          </a:fontRef>
-        </p:style>
-        <p:txBody>
-          <a:bodyPr rtlCol="0" anchor="ctr"/>
-          <a:lstStyle/>
-          <a:p>
-            <a:pPr algn="ctr"/>
-            <a:endParaRPr lang="en-US"/>
-          </a:p>
-        </p:txBody>
-      </p:sp>
-      <p:sp>
-        <p:nvSpPr>
-          <p:cNvPr id="11" name="Arrow: Pentagon 10">
-            <a:extLst>
-              <a:ext uri="{FF2B5EF4-FFF2-40B4-BE49-F238E27FC236}">
-                <a16:creationId xmlns:a16="http://schemas.microsoft.com/office/drawing/2014/main" id="{5A126C11-9D24-49B9-AD5B-1CA83C6A89A2}"/>
-              </a:ext>
-            </a:extLst>
-          </p:cNvPr>
-          <p:cNvSpPr/>
-          <p:nvPr/>
-        </p:nvSpPr>
-        <p:spPr>
-          <a:xfrm flipH="1">
-            <a:off x="4572922" y="5516208"/>
-            <a:ext cx="2550935" cy="1173276"/>
-          </a:xfrm>
-          <a:prstGeom prst="homePlate">
-            <a:avLst/>
-          </a:prstGeom>
-        </p:spPr>
-        <p:style>
-          <a:lnRef idx="1">
-            <a:schemeClr val="accent2"/>
-          </a:lnRef>
-          <a:fillRef idx="2">
-            <a:schemeClr val="accent2"/>
-          </a:fillRef>
-          <a:effectRef idx="1">
-            <a:schemeClr val="accent2"/>
-          </a:effectRef>
-          <a:fontRef idx="minor">
-            <a:schemeClr val="dk1"/>
-          </a:fontRef>
-        </p:style>
-        <p:txBody>
-          <a:bodyPr lIns="91440" tIns="45720" rIns="91440" bIns="45720" rtlCol="0" anchor="ctr"/>
-          <a:lstStyle/>
-          <a:p>
-            <a:pPr algn="ctr"/>
-            <a:r>
-              <a:rPr lang="en-US"/>
-              <a:t>Se </a:t>
-            </a:r>
-            <a:r>
-              <a:rPr lang="en-US" err="1"/>
-              <a:t>calcula</a:t>
-            </a:r>
-            <a:r>
-              <a:rPr lang="en-US"/>
-              <a:t> la media de las </a:t>
-            </a:r>
-            <a:r>
-              <a:rPr lang="en-US" err="1"/>
-              <a:t>estimaciones</a:t>
-            </a:r>
-            <a:r>
-              <a:rPr lang="en-US"/>
-              <a:t> y se </a:t>
-            </a:r>
-            <a:r>
-              <a:rPr lang="en-US" err="1"/>
-              <a:t>trunca</a:t>
-            </a:r>
-          </a:p>
-        </p:txBody>
-      </p:sp>
-      <p:sp>
-        <p:nvSpPr>
-          <p:cNvPr id="13" name="Arrow: Right 12">
-            <a:extLst>
-              <a:ext uri="{FF2B5EF4-FFF2-40B4-BE49-F238E27FC236}">
-                <a16:creationId xmlns:a16="http://schemas.microsoft.com/office/drawing/2014/main" id="{60349142-D779-46A1-A410-39C1B7209758}"/>
-              </a:ext>
-            </a:extLst>
-          </p:cNvPr>
-          <p:cNvSpPr/>
-          <p:nvPr/>
-        </p:nvSpPr>
-        <p:spPr>
-          <a:xfrm flipH="1">
-            <a:off x="3497103" y="5863461"/>
-            <a:ext cx="976470" cy="484450"/>
-          </a:xfrm>
-          <a:prstGeom prst="rightArrow">
-            <a:avLst/>
-          </a:prstGeom>
-        </p:spPr>
-        <p:style>
-          <a:lnRef idx="2">
-            <a:schemeClr val="accent2">
-              <a:shade val="50000"/>
-            </a:schemeClr>
-          </a:lnRef>
-          <a:fillRef idx="1">
-            <a:schemeClr val="accent2"/>
-          </a:fillRef>
-          <a:effectRef idx="0">
-            <a:schemeClr val="accent2"/>
-          </a:effectRef>
-          <a:fontRef idx="minor">
-            <a:schemeClr val="lt1"/>
-          </a:fontRef>
-        </p:style>
-        <p:txBody>
-          <a:bodyPr rtlCol="0" anchor="ctr"/>
-          <a:lstStyle/>
-          <a:p>
-            <a:pPr algn="ctr"/>
-            <a:endParaRPr lang="en-US"/>
-          </a:p>
-        </p:txBody>
-      </p:sp>
-      <p:sp>
-        <p:nvSpPr>
-          <p:cNvPr id="15" name="Arrow: Pentagon 14">
-            <a:extLst>
-              <a:ext uri="{FF2B5EF4-FFF2-40B4-BE49-F238E27FC236}">
-                <a16:creationId xmlns:a16="http://schemas.microsoft.com/office/drawing/2014/main" id="{A3C0F229-5284-46A6-B809-7B402F9C8710}"/>
-              </a:ext>
-            </a:extLst>
-          </p:cNvPr>
-          <p:cNvSpPr/>
-          <p:nvPr/>
-        </p:nvSpPr>
-        <p:spPr>
-          <a:xfrm flipH="1">
-            <a:off x="697319" y="5516207"/>
-            <a:ext cx="2550935" cy="1173276"/>
-          </a:xfrm>
-          <a:prstGeom prst="homePlate">
-            <a:avLst/>
-          </a:prstGeom>
-        </p:spPr>
-        <p:style>
-          <a:lnRef idx="1">
-            <a:schemeClr val="accent2"/>
-          </a:lnRef>
-          <a:fillRef idx="2">
-            <a:schemeClr val="accent2"/>
-          </a:fillRef>
-          <a:effectRef idx="1">
-            <a:schemeClr val="accent2"/>
-          </a:effectRef>
-          <a:fontRef idx="minor">
-            <a:schemeClr val="dk1"/>
-          </a:fontRef>
-        </p:style>
-        <p:txBody>
-          <a:bodyPr lIns="91440" tIns="45720" rIns="91440" bIns="45720" rtlCol="0" anchor="ctr"/>
-          <a:lstStyle/>
-          <a:p>
-            <a:pPr algn="ctr"/>
-            <a:r>
-              <a:rPr lang="en-US"/>
-              <a:t>La </a:t>
-            </a:r>
-            <a:r>
-              <a:rPr lang="en-US" err="1"/>
-              <a:t>duración</a:t>
-            </a:r>
-            <a:r>
-              <a:rPr lang="en-US"/>
-              <a:t> del resto de </a:t>
-            </a:r>
-            <a:r>
-              <a:rPr lang="en-US" err="1"/>
-              <a:t>módulos</a:t>
-            </a:r>
-            <a:r>
-              <a:rPr lang="en-US"/>
-              <a:t> se </a:t>
-            </a:r>
-            <a:r>
-              <a:rPr lang="en-US" err="1"/>
-              <a:t>obtiene</a:t>
-            </a:r>
-            <a:r>
-              <a:rPr lang="en-US"/>
-              <a:t> de forma </a:t>
-            </a:r>
-            <a:r>
-              <a:rPr lang="en-US" err="1"/>
-              <a:t>proporcional</a:t>
-            </a:r>
-          </a:p>
-        </p:txBody>
-      </p:sp>
-    </p:spTree>
-    <p:extLst>
-      <p:ext uri="{BB962C8B-B14F-4D97-AF65-F5344CB8AC3E}">
-        <p14:creationId xmlns:p14="http://schemas.microsoft.com/office/powerpoint/2010/main" val="2139188542"/>
-      </p:ext>
-    </p:extLst>
-  </p:cSld>
-  <p:clrMapOvr>
-    <a:masterClrMapping/>
-  </p:clrMapOvr>
-</p:sld>
-</file>
-
-<file path=ppt/slides/slide11.xml><?xml version="1.0" encoding="utf-8"?>
-<p:sld xmlns:a="http://schemas.openxmlformats.org/drawingml/2006/main" xmlns:r="http://schemas.openxmlformats.org/officeDocument/2006/relationships" xmlns:p="http://schemas.openxmlformats.org/presentationml/2006/main">
-  <p:cSld>
-    <p:spTree>
-      <p:nvGrpSpPr>
-        <p:cNvPr id="1" name=""/>
-        <p:cNvGrpSpPr/>
-        <p:nvPr/>
-      </p:nvGrpSpPr>
-      <p:grpSpPr>
-        <a:xfrm>
-          <a:off x="0" y="0"/>
-          <a:ext cx="0" cy="0"/>
-          <a:chOff x="0" y="0"/>
-          <a:chExt cx="0" cy="0"/>
-        </a:xfrm>
-      </p:grpSpPr>
-      <p:sp>
-        <p:nvSpPr>
-          <p:cNvPr id="2" name="Título 1">
-            <a:extLst>
-              <a:ext uri="{FF2B5EF4-FFF2-40B4-BE49-F238E27FC236}">
-                <a16:creationId xmlns:a16="http://schemas.microsoft.com/office/drawing/2014/main" id="{CB4476DA-A3D7-485A-8127-9B2490D09D86}"/>
-              </a:ext>
-            </a:extLst>
-          </p:cNvPr>
-          <p:cNvSpPr>
-            <a:spLocks noGrp="1"/>
-          </p:cNvSpPr>
-          <p:nvPr>
-            <p:ph type="title"/>
-          </p:nvPr>
-        </p:nvSpPr>
-        <p:spPr>
-          <a:xfrm>
-            <a:off x="457200" y="725954"/>
-            <a:ext cx="8229600" cy="1066800"/>
-          </a:xfrm>
-        </p:spPr>
-        <p:txBody>
-          <a:bodyPr vert="horz" lIns="91440" tIns="45720" rIns="91440" bIns="45720" anchor="ctr">
-            <a:normAutofit/>
-          </a:bodyPr>
-          <a:lstStyle/>
-          <a:p>
-            <a:r>
-              <a:rPr lang="es-ES"/>
-              <a:t>Estimación de Esfuerzos – Delphi</a:t>
-            </a:r>
-          </a:p>
-        </p:txBody>
-      </p:sp>
       <p:sp>
         <p:nvSpPr>
           <p:cNvPr id="10" name="Rectangle: Rounded Corners 9">
@@ -8819,7 +7790,7 @@
           <a:p>
             <a:pPr algn="ctr"/>
             <a:r>
-              <a:rPr lang="en-US" sz="1000">
+              <a:rPr lang="en-US" sz="1000" dirty="0">
                 <a:solidFill>
                   <a:srgbClr val="424456"/>
                 </a:solidFill>
@@ -8829,7 +7800,7 @@
               <a:t>App </a:t>
             </a:r>
             <a:r>
-              <a:rPr lang="en-US" sz="1000" err="1">
+              <a:rPr lang="en-US" sz="1000" dirty="0" err="1">
                 <a:solidFill>
                   <a:srgbClr val="424456"/>
                 </a:solidFill>
@@ -8839,7 +7810,7 @@
               <a:t>Móvil</a:t>
             </a:r>
             <a:r>
-              <a:rPr lang="en-US" sz="1000">
+              <a:rPr lang="en-US" sz="1000" dirty="0">
                 <a:solidFill>
                   <a:srgbClr val="424456"/>
                 </a:solidFill>
@@ -8849,7 +7820,7 @@
               <a:t>: Consulta de </a:t>
             </a:r>
             <a:r>
-              <a:rPr lang="en-US" sz="1000" err="1">
+              <a:rPr lang="en-US" sz="1000" dirty="0" err="1">
                 <a:solidFill>
                   <a:srgbClr val="424456"/>
                 </a:solidFill>
@@ -8859,7 +7830,7 @@
               <a:t>registro</a:t>
             </a:r>
             <a:r>
-              <a:rPr lang="en-US" sz="1000">
+              <a:rPr lang="en-US" sz="1000" dirty="0">
                 <a:solidFill>
                   <a:srgbClr val="424456"/>
                 </a:solidFill>
@@ -8869,7 +7840,7 @@
               <a:t> de </a:t>
             </a:r>
             <a:r>
-              <a:rPr lang="en-US" sz="1000" err="1">
+              <a:rPr lang="en-US" sz="1000" dirty="0" err="1">
                 <a:solidFill>
                   <a:srgbClr val="424456"/>
                 </a:solidFill>
@@ -8878,7 +7849,7 @@
               </a:rPr>
               <a:t>historia</a:t>
             </a:r>
-            <a:endParaRPr lang="en-US" sz="1000">
+            <a:endParaRPr lang="en-US" sz="1000" dirty="0">
               <a:solidFill>
                 <a:srgbClr val="424456"/>
               </a:solidFill>
@@ -8936,7 +7907,7 @@
           <a:p>
             <a:pPr algn="ctr"/>
             <a:r>
-              <a:rPr lang="en-US" sz="1000">
+              <a:rPr lang="en-US" sz="1000" dirty="0">
                 <a:solidFill>
                   <a:srgbClr val="424456"/>
                 </a:solidFill>
@@ -8946,7 +7917,7 @@
               <a:t>App </a:t>
             </a:r>
             <a:r>
-              <a:rPr lang="en-US" sz="1000" err="1">
+              <a:rPr lang="en-US" sz="1000" dirty="0" err="1">
                 <a:solidFill>
                   <a:srgbClr val="424456"/>
                 </a:solidFill>
@@ -8956,7 +7927,7 @@
               <a:t>móvil</a:t>
             </a:r>
             <a:r>
-              <a:rPr lang="en-US" sz="1000">
+              <a:rPr lang="en-US" sz="1000" dirty="0">
                 <a:solidFill>
                   <a:srgbClr val="424456"/>
                 </a:solidFill>
@@ -8966,7 +7937,7 @@
               <a:t>: </a:t>
             </a:r>
             <a:r>
-              <a:rPr lang="en-US" sz="1000" err="1">
+              <a:rPr lang="en-US" sz="1000" dirty="0" err="1">
                 <a:solidFill>
                   <a:srgbClr val="424456"/>
                 </a:solidFill>
@@ -8976,7 +7947,7 @@
               <a:t>Gestión</a:t>
             </a:r>
             <a:r>
-              <a:rPr lang="en-US" sz="1000">
+              <a:rPr lang="en-US" sz="1000" dirty="0">
                 <a:solidFill>
                   <a:srgbClr val="424456"/>
                 </a:solidFill>
@@ -8986,7 +7957,7 @@
               <a:t> del </a:t>
             </a:r>
             <a:r>
-              <a:rPr lang="en-US" sz="1000" err="1">
+              <a:rPr lang="en-US" sz="1000" dirty="0" err="1">
                 <a:solidFill>
                   <a:srgbClr val="424456"/>
                 </a:solidFill>
@@ -8995,27 +7966,7 @@
               </a:rPr>
               <a:t>transporte</a:t>
             </a:r>
-            <a:r>
-              <a:rPr lang="en-US" sz="1000">
-                <a:solidFill>
-                  <a:srgbClr val="424456"/>
-                </a:solidFill>
-                <a:ea typeface="+mn-lt"/>
-                <a:cs typeface="+mn-lt"/>
-              </a:rPr>
-              <a:t> </a:t>
-            </a:r>
-            <a:r>
-              <a:rPr lang="en-US" sz="1000" err="1">
-                <a:solidFill>
-                  <a:srgbClr val="424456"/>
-                </a:solidFill>
-                <a:ea typeface="+mn-lt"/>
-                <a:cs typeface="+mn-lt"/>
-              </a:rPr>
-              <a:t>asistencial</a:t>
-            </a:r>
-            <a:endParaRPr lang="en-US" sz="1000">
+            <a:endParaRPr lang="en-US" sz="1000" dirty="0">
               <a:solidFill>
                 <a:srgbClr val="424456"/>
               </a:solidFill>
@@ -9160,26 +8111,16 @@
           <a:p>
             <a:pPr algn="ctr"/>
             <a:r>
-              <a:rPr lang="en-US" sz="1000">
+              <a:rPr lang="en-US" sz="1000" dirty="0">
                 <a:solidFill>
                   <a:srgbClr val="424456"/>
                 </a:solidFill>
                 <a:ea typeface="+mn-lt"/>
                 <a:cs typeface="+mn-lt"/>
               </a:rPr>
-              <a:t>PODS </a:t>
-            </a:r>
-            <a:r>
-              <a:rPr lang="en-US" sz="1000" err="1">
-                <a:solidFill>
-                  <a:srgbClr val="424456"/>
-                </a:solidFill>
-                <a:ea typeface="+mn-lt"/>
-                <a:cs typeface="+mn-lt"/>
-              </a:rPr>
-              <a:t>Clínicos</a:t>
-            </a:r>
-            <a:endParaRPr lang="en-US">
+              <a:t>Bluetooth</a:t>
+            </a:r>
+            <a:endParaRPr lang="en-US" dirty="0">
               <a:solidFill>
                 <a:srgbClr val="424456"/>
               </a:solidFill>
@@ -9771,7 +8712,7 @@
 </p:sld>
 </file>
 
-<file path=ppt/slides/slide12.xml><?xml version="1.0" encoding="utf-8"?>
+<file path=ppt/slides/slide11.xml><?xml version="1.0" encoding="utf-8"?>
 <p:sld xmlns:a="http://schemas.openxmlformats.org/drawingml/2006/main" xmlns:r="http://schemas.openxmlformats.org/officeDocument/2006/relationships" xmlns:p="http://schemas.openxmlformats.org/presentationml/2006/main">
   <p:cSld>
     <p:spTree>
@@ -9866,7 +8807,7 @@
 </p:sld>
 </file>
 
-<file path=ppt/slides/slide13.xml><?xml version="1.0" encoding="utf-8"?>
+<file path=ppt/slides/slide12.xml><?xml version="1.0" encoding="utf-8"?>
 <p:sld xmlns:a="http://schemas.openxmlformats.org/drawingml/2006/main" xmlns:r="http://schemas.openxmlformats.org/officeDocument/2006/relationships" xmlns:p="http://schemas.openxmlformats.org/presentationml/2006/main">
   <p:cSld>
     <p:spTree>
@@ -10021,7 +8962,7 @@
 </p:sld>
 </file>
 
-<file path=ppt/slides/slide14.xml><?xml version="1.0" encoding="utf-8"?>
+<file path=ppt/slides/slide13.xml><?xml version="1.0" encoding="utf-8"?>
 <p:sld xmlns:a="http://schemas.openxmlformats.org/drawingml/2006/main" xmlns:r="http://schemas.openxmlformats.org/officeDocument/2006/relationships" xmlns:p="http://schemas.openxmlformats.org/presentationml/2006/main">
   <p:cSld>
     <p:spTree>
@@ -10136,7 +9077,7 @@
 </p:sld>
 </file>
 
-<file path=ppt/slides/slide15.xml><?xml version="1.0" encoding="utf-8"?>
+<file path=ppt/slides/slide14.xml><?xml version="1.0" encoding="utf-8"?>
 <p:sld xmlns:a="http://schemas.openxmlformats.org/drawingml/2006/main" xmlns:r="http://schemas.openxmlformats.org/officeDocument/2006/relationships" xmlns:p="http://schemas.openxmlformats.org/presentationml/2006/main">
   <p:cSld>
     <p:spTree>
@@ -10232,7 +9173,7 @@
 </p:sld>
 </file>
 
-<file path=ppt/slides/slide16.xml><?xml version="1.0" encoding="utf-8"?>
+<file path=ppt/slides/slide15.xml><?xml version="1.0" encoding="utf-8"?>
 <p:sld xmlns:a="http://schemas.openxmlformats.org/drawingml/2006/main" xmlns:r="http://schemas.openxmlformats.org/officeDocument/2006/relationships" xmlns:p="http://schemas.openxmlformats.org/presentationml/2006/main">
   <p:cSld>
     <p:spTree>
@@ -10309,8 +9250,8 @@
         </p:blipFill>
         <p:spPr>
           <a:xfrm>
-            <a:off x="1692497" y="1768474"/>
-            <a:ext cx="5373058" cy="4829813"/>
+            <a:off x="1750498" y="1828800"/>
+            <a:ext cx="4838141" cy="4351338"/>
           </a:xfrm>
         </p:spPr>
       </p:pic>
@@ -10327,7 +9268,7 @@
 </p:sld>
 </file>
 
-<file path=ppt/slides/slide17.xml><?xml version="1.0" encoding="utf-8"?>
+<file path=ppt/slides/slide16.xml><?xml version="1.0" encoding="utf-8"?>
 <p:sld xmlns:a="http://schemas.openxmlformats.org/drawingml/2006/main" xmlns:r="http://schemas.openxmlformats.org/officeDocument/2006/relationships" xmlns:p="http://schemas.openxmlformats.org/presentationml/2006/main">
   <p:cSld>
     <p:spTree>
@@ -10382,10 +9323,10 @@
       </p:sp>
       <p:pic>
         <p:nvPicPr>
-          <p:cNvPr id="18" name="Imagen 17">
+          <p:cNvPr id="4" name="Imagen 3">
             <a:extLst>
               <a:ext uri="{FF2B5EF4-FFF2-40B4-BE49-F238E27FC236}">
-                <a16:creationId xmlns:a16="http://schemas.microsoft.com/office/drawing/2014/main" id="{BAA37855-64D5-4372-ACF1-678526D74F5B}"/>
+                <a16:creationId xmlns:a16="http://schemas.microsoft.com/office/drawing/2014/main" id="{5B0690BA-A843-4B1B-9D1B-0A2C8FB3B5D2}"/>
               </a:ext>
             </a:extLst>
           </p:cNvPr>
@@ -10402,8 +9343,8 @@
         </p:blipFill>
         <p:spPr>
           <a:xfrm>
-            <a:off x="321733" y="2148391"/>
-            <a:ext cx="4532049" cy="4182533"/>
+            <a:off x="0" y="2004646"/>
+            <a:ext cx="4349818" cy="4853354"/>
           </a:xfrm>
           <a:prstGeom prst="rect">
             <a:avLst/>
@@ -10412,10 +9353,10 @@
       </p:pic>
       <p:pic>
         <p:nvPicPr>
-          <p:cNvPr id="20" name="Imagen 19">
+          <p:cNvPr id="6" name="Imagen 5">
             <a:extLst>
               <a:ext uri="{FF2B5EF4-FFF2-40B4-BE49-F238E27FC236}">
-                <a16:creationId xmlns:a16="http://schemas.microsoft.com/office/drawing/2014/main" id="{D8E768A0-7E75-4707-A598-7C87180B777C}"/>
+                <a16:creationId xmlns:a16="http://schemas.microsoft.com/office/drawing/2014/main" id="{E14D1292-F545-4F7A-9D85-B7D6C2B83A70}"/>
               </a:ext>
             </a:extLst>
           </p:cNvPr>
@@ -10432,8 +9373,8 @@
         </p:blipFill>
         <p:spPr>
           <a:xfrm>
-            <a:off x="4936067" y="3139870"/>
-            <a:ext cx="4110504" cy="3275722"/>
+            <a:off x="4346213" y="3516923"/>
+            <a:ext cx="4797787" cy="3341077"/>
           </a:xfrm>
           <a:prstGeom prst="rect">
             <a:avLst/>
@@ -10453,7 +9394,7 @@
 </p:sld>
 </file>
 
-<file path=ppt/slides/slide18.xml><?xml version="1.0" encoding="utf-8"?>
+<file path=ppt/slides/slide17.xml><?xml version="1.0" encoding="utf-8"?>
 <p:sld xmlns:a="http://schemas.openxmlformats.org/drawingml/2006/main" xmlns:r="http://schemas.openxmlformats.org/officeDocument/2006/relationships" xmlns:p="http://schemas.openxmlformats.org/presentationml/2006/main">
   <p:cSld>
     <p:spTree>
@@ -10579,7 +9520,7 @@
 </p:sld>
 </file>
 
-<file path=ppt/slides/slide19.xml><?xml version="1.0" encoding="utf-8"?>
+<file path=ppt/slides/slide18.xml><?xml version="1.0" encoding="utf-8"?>
 <p:sld xmlns:a="http://schemas.openxmlformats.org/drawingml/2006/main" xmlns:r="http://schemas.openxmlformats.org/officeDocument/2006/relationships" xmlns:p="http://schemas.openxmlformats.org/presentationml/2006/main">
   <p:cSld>
     <p:spTree>
@@ -10675,6 +9616,102 @@
 </p:sld>
 </file>
 
+<file path=ppt/slides/slide19.xml><?xml version="1.0" encoding="utf-8"?>
+<p:sld xmlns:a="http://schemas.openxmlformats.org/drawingml/2006/main" xmlns:r="http://schemas.openxmlformats.org/officeDocument/2006/relationships" xmlns:p="http://schemas.openxmlformats.org/presentationml/2006/main">
+  <p:cSld>
+    <p:spTree>
+      <p:nvGrpSpPr>
+        <p:cNvPr id="1" name=""/>
+        <p:cNvGrpSpPr/>
+        <p:nvPr/>
+      </p:nvGrpSpPr>
+      <p:grpSpPr>
+        <a:xfrm>
+          <a:off x="0" y="0"/>
+          <a:ext cx="0" cy="0"/>
+          <a:chOff x="0" y="0"/>
+          <a:chExt cx="0" cy="0"/>
+        </a:xfrm>
+      </p:grpSpPr>
+      <p:sp>
+        <p:nvSpPr>
+          <p:cNvPr id="2" name="Título 1">
+            <a:extLst>
+              <a:ext uri="{FF2B5EF4-FFF2-40B4-BE49-F238E27FC236}">
+                <a16:creationId xmlns:a16="http://schemas.microsoft.com/office/drawing/2014/main" id="{CB4476DA-A3D7-485A-8127-9B2490D09D86}"/>
+              </a:ext>
+            </a:extLst>
+          </p:cNvPr>
+          <p:cNvSpPr>
+            <a:spLocks noGrp="1"/>
+          </p:cNvSpPr>
+          <p:nvPr>
+            <p:ph type="title"/>
+          </p:nvPr>
+        </p:nvSpPr>
+        <p:spPr>
+          <a:xfrm>
+            <a:off x="457200" y="725954"/>
+            <a:ext cx="8229600" cy="1066800"/>
+          </a:xfrm>
+        </p:spPr>
+        <p:txBody>
+          <a:bodyPr vert="horz" lIns="91440" tIns="45720" rIns="91440" bIns="45720" anchor="ctr">
+            <a:normAutofit fontScale="90000"/>
+          </a:bodyPr>
+          <a:lstStyle/>
+          <a:p>
+            <a:pPr indent="-255905"/>
+            <a:r>
+              <a:rPr lang="es-ES" dirty="0"/>
+              <a:t>Presupuesto del Proyecto – Presupuesto de cliente: Ponderación</a:t>
+            </a:r>
+          </a:p>
+        </p:txBody>
+      </p:sp>
+      <p:pic>
+        <p:nvPicPr>
+          <p:cNvPr id="4" name="Imagen 3">
+            <a:extLst>
+              <a:ext uri="{FF2B5EF4-FFF2-40B4-BE49-F238E27FC236}">
+                <a16:creationId xmlns:a16="http://schemas.microsoft.com/office/drawing/2014/main" id="{24E3165E-6532-4999-AF59-7054495C4205}"/>
+              </a:ext>
+            </a:extLst>
+          </p:cNvPr>
+          <p:cNvPicPr>
+            <a:picLocks noChangeAspect="1"/>
+          </p:cNvPicPr>
+          <p:nvPr/>
+        </p:nvPicPr>
+        <p:blipFill>
+          <a:blip r:embed="rId2"/>
+          <a:stretch>
+            <a:fillRect/>
+          </a:stretch>
+        </p:blipFill>
+        <p:spPr>
+          <a:xfrm>
+            <a:off x="1266092" y="1772441"/>
+            <a:ext cx="6361276" cy="5085559"/>
+          </a:xfrm>
+          <a:prstGeom prst="rect">
+            <a:avLst/>
+          </a:prstGeom>
+        </p:spPr>
+      </p:pic>
+    </p:spTree>
+    <p:extLst>
+      <p:ext uri="{BB962C8B-B14F-4D97-AF65-F5344CB8AC3E}">
+        <p14:creationId xmlns:p14="http://schemas.microsoft.com/office/powerpoint/2010/main" val="2881508138"/>
+      </p:ext>
+    </p:extLst>
+  </p:cSld>
+  <p:clrMapOvr>
+    <a:masterClrMapping/>
+  </p:clrMapOvr>
+</p:sld>
+</file>
+
 <file path=ppt/slides/slide2.xml><?xml version="1.0" encoding="utf-8"?>
 <p:sld xmlns:a="http://schemas.openxmlformats.org/drawingml/2006/main" xmlns:r="http://schemas.openxmlformats.org/officeDocument/2006/relationships" xmlns:p="http://schemas.openxmlformats.org/presentationml/2006/main">
   <p:cSld>
@@ -10748,21 +9785,21 @@
             <a:pPr indent="-255905"/>
             <a:r>
               <a:rPr lang="es-ES" dirty="0"/>
-              <a:t>Planificación del Proyecto (WBS)</a:t>
+              <a:t>Planificación del Proyecto</a:t>
             </a:r>
           </a:p>
           <a:p>
             <a:pPr indent="-255905"/>
             <a:r>
               <a:rPr lang="es-ES" dirty="0"/>
-              <a:t>Estructura del equipo (OBS)</a:t>
+              <a:t>Estructura del equipo</a:t>
             </a:r>
           </a:p>
           <a:p>
             <a:pPr indent="-255905"/>
             <a:r>
               <a:rPr lang="es-ES" dirty="0"/>
-              <a:t>Productos (PBS)</a:t>
+              <a:t>Productos</a:t>
             </a:r>
           </a:p>
           <a:p>
@@ -10783,7 +9820,7 @@
             <a:pPr indent="-255905"/>
             <a:r>
               <a:rPr lang="es-ES" dirty="0"/>
-              <a:t>Trazabilidad de las estimaciones/ WBS/ Presupuesto</a:t>
+              <a:t>Trazabilidad de las estimaciones / Presupuesto</a:t>
             </a:r>
           </a:p>
           <a:p>
@@ -10869,18 +9906,18 @@
           <a:p>
             <a:pPr indent="-255905"/>
             <a:r>
-              <a:rPr lang="es-ES" dirty="0"/>
-              <a:t>Presupuesto del Proyecto – Presupuesto de cliente: Ponderación</a:t>
+              <a:rPr lang="es-ES"/>
+              <a:t>Presupuesto del Proyecto – Presupuesto de cliente</a:t>
             </a:r>
           </a:p>
         </p:txBody>
       </p:sp>
       <p:pic>
         <p:nvPicPr>
-          <p:cNvPr id="7" name="Imagen 6">
+          <p:cNvPr id="4" name="Imagen 3">
             <a:extLst>
               <a:ext uri="{FF2B5EF4-FFF2-40B4-BE49-F238E27FC236}">
-                <a16:creationId xmlns:a16="http://schemas.microsoft.com/office/drawing/2014/main" id="{7E1782D5-B6CB-4571-9BED-BC78F4459467}"/>
+                <a16:creationId xmlns:a16="http://schemas.microsoft.com/office/drawing/2014/main" id="{7CF695D4-3AD8-4608-A1BF-6E26FDA00E26}"/>
               </a:ext>
             </a:extLst>
           </p:cNvPr>
@@ -10897,8 +9934,8 @@
         </p:blipFill>
         <p:spPr>
           <a:xfrm>
-            <a:off x="891645" y="1792753"/>
-            <a:ext cx="7361624" cy="4870513"/>
+            <a:off x="2254556" y="1792754"/>
+            <a:ext cx="4353533" cy="5065246"/>
           </a:xfrm>
           <a:prstGeom prst="rect">
             <a:avLst/>
@@ -10908,7 +9945,7 @@
     </p:spTree>
     <p:extLst>
       <p:ext uri="{BB962C8B-B14F-4D97-AF65-F5344CB8AC3E}">
-        <p14:creationId xmlns:p14="http://schemas.microsoft.com/office/powerpoint/2010/main" val="2881508138"/>
+        <p14:creationId xmlns:p14="http://schemas.microsoft.com/office/powerpoint/2010/main" val="3844664025"/>
       </p:ext>
     </p:extLst>
   </p:cSld>
@@ -10965,104 +10002,8 @@
           <a:p>
             <a:pPr indent="-255905"/>
             <a:r>
-              <a:rPr lang="es-ES"/>
-              <a:t>Presupuesto del Proyecto – Presupuesto de cliente</a:t>
-            </a:r>
-          </a:p>
-        </p:txBody>
-      </p:sp>
-      <p:pic>
-        <p:nvPicPr>
-          <p:cNvPr id="7" name="Imagen 6">
-            <a:extLst>
-              <a:ext uri="{FF2B5EF4-FFF2-40B4-BE49-F238E27FC236}">
-                <a16:creationId xmlns:a16="http://schemas.microsoft.com/office/drawing/2014/main" id="{FEB8D126-78C1-4661-AC8B-4BE946547666}"/>
-              </a:ext>
-            </a:extLst>
-          </p:cNvPr>
-          <p:cNvPicPr>
-            <a:picLocks noChangeAspect="1"/>
-          </p:cNvPicPr>
-          <p:nvPr/>
-        </p:nvPicPr>
-        <p:blipFill>
-          <a:blip r:embed="rId2"/>
-          <a:stretch>
-            <a:fillRect/>
-          </a:stretch>
-        </p:blipFill>
-        <p:spPr>
-          <a:xfrm>
-            <a:off x="2023269" y="2019665"/>
-            <a:ext cx="5274998" cy="4710595"/>
-          </a:xfrm>
-          <a:prstGeom prst="rect">
-            <a:avLst/>
-          </a:prstGeom>
-        </p:spPr>
-      </p:pic>
-    </p:spTree>
-    <p:extLst>
-      <p:ext uri="{BB962C8B-B14F-4D97-AF65-F5344CB8AC3E}">
-        <p14:creationId xmlns:p14="http://schemas.microsoft.com/office/powerpoint/2010/main" val="3844664025"/>
-      </p:ext>
-    </p:extLst>
-  </p:cSld>
-  <p:clrMapOvr>
-    <a:masterClrMapping/>
-  </p:clrMapOvr>
-</p:sld>
-</file>
-
-<file path=ppt/slides/slide22.xml><?xml version="1.0" encoding="utf-8"?>
-<p:sld xmlns:a="http://schemas.openxmlformats.org/drawingml/2006/main" xmlns:r="http://schemas.openxmlformats.org/officeDocument/2006/relationships" xmlns:p="http://schemas.openxmlformats.org/presentationml/2006/main">
-  <p:cSld>
-    <p:spTree>
-      <p:nvGrpSpPr>
-        <p:cNvPr id="1" name=""/>
-        <p:cNvGrpSpPr/>
-        <p:nvPr/>
-      </p:nvGrpSpPr>
-      <p:grpSpPr>
-        <a:xfrm>
-          <a:off x="0" y="0"/>
-          <a:ext cx="0" cy="0"/>
-          <a:chOff x="0" y="0"/>
-          <a:chExt cx="0" cy="0"/>
-        </a:xfrm>
-      </p:grpSpPr>
-      <p:sp>
-        <p:nvSpPr>
-          <p:cNvPr id="2" name="Título 1">
-            <a:extLst>
-              <a:ext uri="{FF2B5EF4-FFF2-40B4-BE49-F238E27FC236}">
-                <a16:creationId xmlns:a16="http://schemas.microsoft.com/office/drawing/2014/main" id="{CB4476DA-A3D7-485A-8127-9B2490D09D86}"/>
-              </a:ext>
-            </a:extLst>
-          </p:cNvPr>
-          <p:cNvSpPr>
-            <a:spLocks noGrp="1"/>
-          </p:cNvSpPr>
-          <p:nvPr>
-            <p:ph type="title"/>
-          </p:nvPr>
-        </p:nvSpPr>
-        <p:spPr>
-          <a:xfrm>
-            <a:off x="457200" y="725954"/>
-            <a:ext cx="8229600" cy="1066800"/>
-          </a:xfrm>
-        </p:spPr>
-        <p:txBody>
-          <a:bodyPr vert="horz" lIns="91440" tIns="45720" rIns="91440" bIns="45720" anchor="ctr">
-            <a:normAutofit fontScale="90000"/>
-          </a:bodyPr>
-          <a:lstStyle/>
-          <a:p>
-            <a:pPr indent="-255905"/>
-            <a:r>
-              <a:rPr lang="es-ES"/>
-              <a:t>Trazabilidad de las estimaciones/ WBS/ Presupuesto</a:t>
+              <a:rPr lang="es-ES" dirty="0"/>
+              <a:t>Trazabilidad de las estimaciones / Presupuesto</a:t>
             </a:r>
           </a:p>
         </p:txBody>
@@ -11097,64 +10038,65 @@
           <a:p>
             <a:pPr indent="-255905"/>
             <a:r>
-              <a:rPr lang="en-GB"/>
+              <a:rPr lang="en-GB" dirty="0"/>
               <a:t>Para </a:t>
             </a:r>
             <a:r>
-              <a:rPr lang="en-GB" err="1"/>
+              <a:rPr lang="en-GB" dirty="0" err="1"/>
               <a:t>resumir</a:t>
             </a:r>
             <a:r>
-              <a:rPr lang="en-GB"/>
+              <a:rPr lang="en-GB" dirty="0"/>
               <a:t> se </a:t>
             </a:r>
             <a:r>
-              <a:rPr lang="en-GB" err="1"/>
+              <a:rPr lang="en-GB" dirty="0" err="1"/>
               <a:t>mostrará</a:t>
             </a:r>
             <a:r>
-              <a:rPr lang="en-GB"/>
+              <a:rPr lang="en-GB" dirty="0"/>
               <a:t> con un </a:t>
             </a:r>
             <a:r>
-              <a:rPr lang="en-GB" err="1"/>
+              <a:rPr lang="en-GB" dirty="0" err="1"/>
               <a:t>módulo</a:t>
             </a:r>
             <a:r>
-              <a:rPr lang="en-GB"/>
-              <a:t>, el de </a:t>
-            </a:r>
-            <a:r>
-              <a:rPr lang="en-GB" err="1"/>
+              <a:rPr lang="en-GB" dirty="0"/>
+              <a:t>, </a:t>
+            </a:r>
+            <a:r>
+              <a:rPr lang="en-GB" dirty="0" err="1"/>
+              <a:t>el</a:t>
+            </a:r>
+            <a:r>
+              <a:rPr lang="en-GB" dirty="0"/>
+              <a:t> de </a:t>
+            </a:r>
+            <a:r>
+              <a:rPr lang="en-GB" dirty="0" err="1"/>
               <a:t>registro</a:t>
             </a:r>
             <a:r>
-              <a:rPr lang="en-GB"/>
+              <a:rPr lang="en-GB" dirty="0"/>
               <a:t> de </a:t>
             </a:r>
             <a:r>
-              <a:rPr lang="en-GB" err="1"/>
+              <a:rPr lang="en-GB" dirty="0" err="1"/>
               <a:t>historia</a:t>
             </a:r>
-            <a:endParaRPr lang="en-GB"/>
+            <a:endParaRPr lang="en-GB" dirty="0"/>
           </a:p>
           <a:p>
             <a:pPr indent="-255905"/>
             <a:r>
-              <a:rPr lang="en-GB"/>
-              <a:t>WBS</a:t>
-            </a:r>
-          </a:p>
-          <a:p>
-            <a:pPr indent="-255905"/>
-            <a:r>
-              <a:rPr lang="es-ES">
+              <a:rPr lang="es-ES" dirty="0">
                 <a:ea typeface="+mn-lt"/>
                 <a:cs typeface="+mn-lt"/>
               </a:rPr>
               <a:t>Se divide en 3 partes:</a:t>
             </a:r>
-            <a:endParaRPr lang="en-US">
+            <a:endParaRPr lang="en-US" dirty="0">
               <a:ea typeface="+mn-lt"/>
               <a:cs typeface="+mn-lt"/>
             </a:endParaRPr>
@@ -11166,13 +10108,13 @@
               </a:buClr>
             </a:pPr>
             <a:r>
-              <a:rPr lang="es-ES" err="1">
+              <a:rPr lang="es-ES" dirty="0" err="1">
                 <a:ea typeface="+mn-lt"/>
                 <a:cs typeface="+mn-lt"/>
               </a:rPr>
               <a:t>Analisis</a:t>
             </a:r>
-            <a:endParaRPr lang="en-US" err="1">
+            <a:endParaRPr lang="en-US" dirty="0">
               <a:ea typeface="+mn-lt"/>
               <a:cs typeface="+mn-lt"/>
             </a:endParaRPr>
@@ -11184,7 +10126,7 @@
               </a:buClr>
             </a:pPr>
             <a:r>
-              <a:rPr lang="es-ES"/>
+              <a:rPr lang="es-ES" dirty="0"/>
               <a:t>Desarrollo</a:t>
             </a:r>
           </a:p>
@@ -11195,7 +10137,7 @@
               </a:buClr>
             </a:pPr>
             <a:r>
-              <a:rPr lang="es-ES"/>
+              <a:rPr lang="es-ES" dirty="0"/>
               <a:t>Pruebas</a:t>
             </a:r>
           </a:p>
@@ -11424,7 +10366,7 @@
         </p:blipFill>
         <p:spPr>
           <a:xfrm>
-            <a:off x="2974340" y="4270369"/>
+            <a:off x="1406420" y="4169755"/>
             <a:ext cx="5922404" cy="790765"/>
           </a:xfrm>
           <a:prstGeom prst="rect">
@@ -11445,7 +10387,7 @@
 </p:sld>
 </file>
 
-<file path=ppt/slides/slide23.xml><?xml version="1.0" encoding="utf-8"?>
+<file path=ppt/slides/slide22.xml><?xml version="1.0" encoding="utf-8"?>
 <p:sld xmlns:a="http://schemas.openxmlformats.org/drawingml/2006/main" xmlns:r="http://schemas.openxmlformats.org/officeDocument/2006/relationships" xmlns:p="http://schemas.openxmlformats.org/presentationml/2006/main">
   <p:cSld>
     <p:spTree>
@@ -11492,8 +10434,8 @@
           <a:p>
             <a:pPr indent="-255905"/>
             <a:r>
-              <a:rPr lang="es-ES"/>
-              <a:t>Trazabilidad de las estimaciones/ WBS/ Presupuesto</a:t>
+              <a:rPr lang="es-ES" dirty="0"/>
+              <a:t>Trazabilidad de las estimaciones / Presupuesto</a:t>
             </a:r>
           </a:p>
         </p:txBody>
@@ -11931,7 +10873,7 @@
 </p:sld>
 </file>
 
-<file path=ppt/slides/slide24.xml><?xml version="1.0" encoding="utf-8"?>
+<file path=ppt/slides/slide23.xml><?xml version="1.0" encoding="utf-8"?>
 <p:sld xmlns:a="http://schemas.openxmlformats.org/drawingml/2006/main" xmlns:r="http://schemas.openxmlformats.org/officeDocument/2006/relationships" xmlns:p="http://schemas.openxmlformats.org/presentationml/2006/main">
   <p:cSld>
     <p:spTree>
@@ -11978,8 +10920,8 @@
           <a:p>
             <a:pPr indent="-255905"/>
             <a:r>
-              <a:rPr lang="es-ES"/>
-              <a:t>Trazabilidad de las estimaciones/ WBS/ Presupuesto</a:t>
+              <a:rPr lang="es-ES" dirty="0"/>
+              <a:t>Trazabilidad de las estimaciones / Presupuesto</a:t>
             </a:r>
           </a:p>
         </p:txBody>
@@ -12366,8 +11308,8 @@
         </p:blipFill>
         <p:spPr>
           <a:xfrm>
-            <a:off x="1474545" y="4021473"/>
-            <a:ext cx="6096504" cy="2183497"/>
+            <a:off x="457200" y="3356076"/>
+            <a:ext cx="7750738" cy="2775970"/>
           </a:xfrm>
           <a:prstGeom prst="rect">
             <a:avLst/>
@@ -12378,6 +11320,158 @@
     <p:extLst>
       <p:ext uri="{BB962C8B-B14F-4D97-AF65-F5344CB8AC3E}">
         <p14:creationId xmlns:p14="http://schemas.microsoft.com/office/powerpoint/2010/main" val="2310523633"/>
+      </p:ext>
+    </p:extLst>
+  </p:cSld>
+  <p:clrMapOvr>
+    <a:masterClrMapping/>
+  </p:clrMapOvr>
+</p:sld>
+</file>
+
+<file path=ppt/slides/slide24.xml><?xml version="1.0" encoding="utf-8"?>
+<p:sld xmlns:a="http://schemas.openxmlformats.org/drawingml/2006/main" xmlns:r="http://schemas.openxmlformats.org/officeDocument/2006/relationships" xmlns:p="http://schemas.openxmlformats.org/presentationml/2006/main">
+  <p:cSld>
+    <p:spTree>
+      <p:nvGrpSpPr>
+        <p:cNvPr id="1" name=""/>
+        <p:cNvGrpSpPr/>
+        <p:nvPr/>
+      </p:nvGrpSpPr>
+      <p:grpSpPr>
+        <a:xfrm>
+          <a:off x="0" y="0"/>
+          <a:ext cx="0" cy="0"/>
+          <a:chOff x="0" y="0"/>
+          <a:chExt cx="0" cy="0"/>
+        </a:xfrm>
+      </p:grpSpPr>
+      <p:sp>
+        <p:nvSpPr>
+          <p:cNvPr id="2" name="Título 1">
+            <a:extLst>
+              <a:ext uri="{FF2B5EF4-FFF2-40B4-BE49-F238E27FC236}">
+                <a16:creationId xmlns:a16="http://schemas.microsoft.com/office/drawing/2014/main" id="{CB4476DA-A3D7-485A-8127-9B2490D09D86}"/>
+              </a:ext>
+            </a:extLst>
+          </p:cNvPr>
+          <p:cNvSpPr>
+            <a:spLocks noGrp="1"/>
+          </p:cNvSpPr>
+          <p:nvPr>
+            <p:ph type="title"/>
+          </p:nvPr>
+        </p:nvSpPr>
+        <p:spPr>
+          <a:xfrm>
+            <a:off x="457200" y="856583"/>
+            <a:ext cx="8229600" cy="1066800"/>
+          </a:xfrm>
+        </p:spPr>
+        <p:txBody>
+          <a:bodyPr vert="horz" lIns="91440" tIns="45720" rIns="91440" bIns="45720" anchor="ctr">
+            <a:normAutofit fontScale="90000"/>
+          </a:bodyPr>
+          <a:lstStyle/>
+          <a:p>
+            <a:pPr algn="ctr"/>
+            <a:r>
+              <a:rPr lang="es-ES" dirty="0"/>
+              <a:t>Plan de Gestión de las</a:t>
+            </a:r>
+            <a:br>
+              <a:rPr lang="es-ES" dirty="0"/>
+            </a:br>
+            <a:r>
+              <a:rPr lang="es-ES" dirty="0"/>
+              <a:t>comunicaciones I: Introducción y Objetivos</a:t>
+            </a:r>
+          </a:p>
+        </p:txBody>
+      </p:sp>
+      <p:sp>
+        <p:nvSpPr>
+          <p:cNvPr id="21" name="Marcador de contenido 3">
+            <a:extLst>
+              <a:ext uri="{FF2B5EF4-FFF2-40B4-BE49-F238E27FC236}">
+                <a16:creationId xmlns:a16="http://schemas.microsoft.com/office/drawing/2014/main" id="{BDCFB980-D920-4828-A868-EBA664C327E5}"/>
+              </a:ext>
+            </a:extLst>
+          </p:cNvPr>
+          <p:cNvSpPr>
+            <a:spLocks noGrp="1"/>
+          </p:cNvSpPr>
+          <p:nvPr>
+            <p:ph idx="1"/>
+          </p:nvPr>
+        </p:nvSpPr>
+        <p:spPr>
+          <a:xfrm>
+            <a:off x="946404" y="2168768"/>
+            <a:ext cx="6446520" cy="4011369"/>
+          </a:xfrm>
+        </p:spPr>
+        <p:txBody>
+          <a:bodyPr>
+            <a:normAutofit/>
+          </a:bodyPr>
+          <a:lstStyle/>
+          <a:p>
+            <a:r>
+              <a:rPr lang="es-ES" dirty="0"/>
+              <a:t>Sistema que reduzca los costes e incremente la calidad de vida de los usuarios.</a:t>
+            </a:r>
+          </a:p>
+          <a:p>
+            <a:r>
+              <a:rPr lang="es-ES" dirty="0"/>
+              <a:t>Objetivos:</a:t>
+            </a:r>
+          </a:p>
+          <a:p>
+            <a:pPr lvl="1"/>
+            <a:r>
+              <a:rPr lang="es-ES" dirty="0"/>
+              <a:t>Mantener a los interesados informados.</a:t>
+            </a:r>
+          </a:p>
+          <a:p>
+            <a:pPr lvl="1"/>
+            <a:r>
+              <a:rPr lang="es-ES" dirty="0"/>
+              <a:t>Retroalimentación (usuarios y empresa).</a:t>
+            </a:r>
+          </a:p>
+          <a:p>
+            <a:pPr lvl="1"/>
+            <a:r>
+              <a:rPr lang="es-ES" dirty="0"/>
+              <a:t>Aceptación por parte de éstos.</a:t>
+            </a:r>
+          </a:p>
+          <a:p>
+            <a:pPr lvl="1"/>
+            <a:r>
+              <a:rPr lang="es-ES" dirty="0"/>
+              <a:t>Informar avance/dificultades.</a:t>
+            </a:r>
+          </a:p>
+          <a:p>
+            <a:pPr lvl="1"/>
+            <a:r>
+              <a:rPr lang="es-ES" dirty="0"/>
+              <a:t>Visión de lo que sucede en todo momento.</a:t>
+            </a:r>
+          </a:p>
+          <a:p>
+            <a:endParaRPr lang="en-GB" dirty="0"/>
+          </a:p>
+        </p:txBody>
+      </p:sp>
+    </p:spTree>
+    <p:extLst>
+      <p:ext uri="{BB962C8B-B14F-4D97-AF65-F5344CB8AC3E}">
+        <p14:creationId xmlns:p14="http://schemas.microsoft.com/office/powerpoint/2010/main" val="2427531705"/>
       </p:ext>
     </p:extLst>
   </p:cSld>
@@ -12406,153 +11500,6 @@
       </p:grpSpPr>
       <p:sp>
         <p:nvSpPr>
-          <p:cNvPr id="2" name="Título 1">
-            <a:extLst>
-              <a:ext uri="{FF2B5EF4-FFF2-40B4-BE49-F238E27FC236}">
-                <a16:creationId xmlns:a16="http://schemas.microsoft.com/office/drawing/2014/main" id="{CB4476DA-A3D7-485A-8127-9B2490D09D86}"/>
-              </a:ext>
-            </a:extLst>
-          </p:cNvPr>
-          <p:cNvSpPr>
-            <a:spLocks noGrp="1"/>
-          </p:cNvSpPr>
-          <p:nvPr>
-            <p:ph type="title"/>
-          </p:nvPr>
-        </p:nvSpPr>
-        <p:spPr>
-          <a:xfrm>
-            <a:off x="457200" y="856583"/>
-            <a:ext cx="8229600" cy="1066800"/>
-          </a:xfrm>
-        </p:spPr>
-        <p:txBody>
-          <a:bodyPr vert="horz" lIns="91440" tIns="45720" rIns="91440" bIns="45720" anchor="ctr">
-            <a:normAutofit fontScale="90000"/>
-          </a:bodyPr>
-          <a:lstStyle/>
-          <a:p>
-            <a:pPr algn="ctr"/>
-            <a:r>
-              <a:rPr lang="es-ES"/>
-              <a:t>Plan de Gestión de las</a:t>
-            </a:r>
-            <a:br>
-              <a:rPr lang="es-ES"/>
-            </a:br>
-            <a:r>
-              <a:rPr lang="es-ES"/>
-              <a:t>comunicaciones I: Introducción y Objetivos</a:t>
-            </a:r>
-          </a:p>
-        </p:txBody>
-      </p:sp>
-      <p:sp>
-        <p:nvSpPr>
-          <p:cNvPr id="21" name="Marcador de contenido 3">
-            <a:extLst>
-              <a:ext uri="{FF2B5EF4-FFF2-40B4-BE49-F238E27FC236}">
-                <a16:creationId xmlns:a16="http://schemas.microsoft.com/office/drawing/2014/main" id="{BDCFB980-D920-4828-A868-EBA664C327E5}"/>
-              </a:ext>
-            </a:extLst>
-          </p:cNvPr>
-          <p:cNvSpPr>
-            <a:spLocks noGrp="1"/>
-          </p:cNvSpPr>
-          <p:nvPr>
-            <p:ph idx="1"/>
-          </p:nvPr>
-        </p:nvSpPr>
-        <p:spPr/>
-        <p:txBody>
-          <a:bodyPr>
-            <a:normAutofit/>
-          </a:bodyPr>
-          <a:lstStyle/>
-          <a:p>
-            <a:r>
-              <a:rPr lang="es-ES"/>
-              <a:t>Sistema que reduzca los costes hospitalarios e incremente la calidad de vida de los usuarios.</a:t>
-            </a:r>
-          </a:p>
-          <a:p>
-            <a:r>
-              <a:rPr lang="es-ES"/>
-              <a:t>Objetivos:</a:t>
-            </a:r>
-          </a:p>
-          <a:p>
-            <a:pPr lvl="1"/>
-            <a:r>
-              <a:rPr lang="es-ES"/>
-              <a:t>Mantener a los interesados informados.</a:t>
-            </a:r>
-          </a:p>
-          <a:p>
-            <a:pPr lvl="1"/>
-            <a:r>
-              <a:rPr lang="es-ES"/>
-              <a:t>Retroalimentación (usuarios y empresa).</a:t>
-            </a:r>
-          </a:p>
-          <a:p>
-            <a:pPr lvl="1"/>
-            <a:r>
-              <a:rPr lang="es-ES"/>
-              <a:t>Aceptación por parte de éstos.</a:t>
-            </a:r>
-          </a:p>
-          <a:p>
-            <a:pPr lvl="1"/>
-            <a:r>
-              <a:rPr lang="es-ES"/>
-              <a:t>Informar avance/dificultades.</a:t>
-            </a:r>
-          </a:p>
-          <a:p>
-            <a:pPr lvl="1"/>
-            <a:r>
-              <a:rPr lang="es-ES"/>
-              <a:t>Visión de lo que sucede en todo momento.</a:t>
-            </a:r>
-          </a:p>
-          <a:p>
-            <a:endParaRPr lang="en-GB"/>
-          </a:p>
-        </p:txBody>
-      </p:sp>
-    </p:spTree>
-    <p:extLst>
-      <p:ext uri="{BB962C8B-B14F-4D97-AF65-F5344CB8AC3E}">
-        <p14:creationId xmlns:p14="http://schemas.microsoft.com/office/powerpoint/2010/main" val="2427531705"/>
-      </p:ext>
-    </p:extLst>
-  </p:cSld>
-  <p:clrMapOvr>
-    <a:masterClrMapping/>
-  </p:clrMapOvr>
-</p:sld>
-</file>
-
-<file path=ppt/slides/slide26.xml><?xml version="1.0" encoding="utf-8"?>
-<p:sld xmlns:a="http://schemas.openxmlformats.org/drawingml/2006/main" xmlns:r="http://schemas.openxmlformats.org/officeDocument/2006/relationships" xmlns:p="http://schemas.openxmlformats.org/presentationml/2006/main">
-  <p:cSld>
-    <p:spTree>
-      <p:nvGrpSpPr>
-        <p:cNvPr id="1" name=""/>
-        <p:cNvGrpSpPr/>
-        <p:nvPr/>
-      </p:nvGrpSpPr>
-      <p:grpSpPr>
-        <a:xfrm>
-          <a:off x="0" y="0"/>
-          <a:ext cx="0" cy="0"/>
-          <a:chOff x="0" y="0"/>
-          <a:chExt cx="0" cy="0"/>
-        </a:xfrm>
-      </p:grpSpPr>
-      <p:sp>
-        <p:nvSpPr>
           <p:cNvPr id="4" name="Título 1">
             <a:extLst>
               <a:ext uri="{FF2B5EF4-FFF2-40B4-BE49-F238E27FC236}">
@@ -12606,11 +11553,17 @@
           <p:cNvGraphicFramePr>
             <a:graphicFrameLocks noGrp="1"/>
           </p:cNvGraphicFramePr>
-          <p:nvPr/>
+          <p:nvPr>
+            <p:extLst>
+              <p:ext uri="{D42A27DB-BD31-4B8C-83A1-F6EECF244321}">
+                <p14:modId xmlns:p14="http://schemas.microsoft.com/office/powerpoint/2010/main" val="3258032301"/>
+              </p:ext>
+            </p:extLst>
+          </p:nvPr>
         </p:nvGraphicFramePr>
         <p:xfrm>
-          <a:off x="1675182" y="2249488"/>
-          <a:ext cx="5793635" cy="4324351"/>
+          <a:off x="1487613" y="2077139"/>
+          <a:ext cx="5793635" cy="4780861"/>
         </p:xfrm>
         <a:graphic>
           <a:graphicData uri="http://schemas.openxmlformats.org/drawingml/2006/table">
@@ -12967,12 +11920,12 @@
                         </a:lnSpc>
                       </a:pPr>
                       <a:r>
-                        <a:rPr lang="es-ES" sz="1000">
+                        <a:rPr lang="es-ES" sz="1000" dirty="0">
                           <a:effectLst/>
                         </a:rPr>
                         <a:t>Interlocutor entre stakeholders y trabajadores</a:t>
                       </a:r>
-                      <a:endParaRPr lang="es-ES" sz="1000">
+                      <a:endParaRPr lang="es-ES" sz="1000" dirty="0">
                         <a:effectLst/>
                         <a:latin typeface="Calibri" panose="020F0502020204030204" pitchFamily="34" charset="0"/>
                         <a:ea typeface="Yu Mincho" panose="02020400000000000000" pitchFamily="18" charset="-128"/>
@@ -13601,12 +12554,12 @@
                         </a:lnSpc>
                       </a:pPr>
                       <a:r>
-                        <a:rPr lang="es-ES" sz="1000">
+                        <a:rPr lang="es-ES" sz="1000" dirty="0">
                           <a:effectLst/>
                         </a:rPr>
                         <a:t>Jefe de Proyecto, Equipo de formación.</a:t>
                       </a:r>
-                      <a:endParaRPr lang="es-ES" sz="1000">
+                      <a:endParaRPr lang="es-ES" sz="1000" dirty="0">
                         <a:effectLst/>
                         <a:latin typeface="Calibri" panose="020F0502020204030204" pitchFamily="34" charset="0"/>
                         <a:ea typeface="Yu Mincho" panose="02020400000000000000" pitchFamily="18" charset="-128"/>
@@ -13639,6 +12592,147 @@
 </p:sld>
 </file>
 
+<file path=ppt/slides/slide26.xml><?xml version="1.0" encoding="utf-8"?>
+<p:sld xmlns:a="http://schemas.openxmlformats.org/drawingml/2006/main" xmlns:r="http://schemas.openxmlformats.org/officeDocument/2006/relationships" xmlns:p="http://schemas.openxmlformats.org/presentationml/2006/main">
+  <p:cSld>
+    <p:spTree>
+      <p:nvGrpSpPr>
+        <p:cNvPr id="1" name=""/>
+        <p:cNvGrpSpPr/>
+        <p:nvPr/>
+      </p:nvGrpSpPr>
+      <p:grpSpPr>
+        <a:xfrm>
+          <a:off x="0" y="0"/>
+          <a:ext cx="0" cy="0"/>
+          <a:chOff x="0" y="0"/>
+          <a:chExt cx="0" cy="0"/>
+        </a:xfrm>
+      </p:grpSpPr>
+      <p:sp>
+        <p:nvSpPr>
+          <p:cNvPr id="4" name="Título 1">
+            <a:extLst>
+              <a:ext uri="{FF2B5EF4-FFF2-40B4-BE49-F238E27FC236}">
+                <a16:creationId xmlns:a16="http://schemas.microsoft.com/office/drawing/2014/main" id="{81D09D20-EFE2-40E7-AA64-5A0EE567079C}"/>
+              </a:ext>
+            </a:extLst>
+          </p:cNvPr>
+          <p:cNvSpPr>
+            <a:spLocks noGrp="1"/>
+          </p:cNvSpPr>
+          <p:nvPr>
+            <p:ph type="title"/>
+          </p:nvPr>
+        </p:nvSpPr>
+        <p:spPr/>
+        <p:txBody>
+          <a:bodyPr vert="horz" lIns="91440" tIns="45720" rIns="91440" bIns="45720" anchor="ctr">
+            <a:normAutofit/>
+          </a:bodyPr>
+          <a:lstStyle/>
+          <a:p>
+            <a:pPr algn="ctr"/>
+            <a:r>
+              <a:rPr lang="es-ES"/>
+              <a:t>Plan de Gestión de las</a:t>
+            </a:r>
+            <a:br>
+              <a:rPr lang="es-ES"/>
+            </a:br>
+            <a:r>
+              <a:rPr lang="es-ES"/>
+              <a:t>comunicaciones III: Tipos</a:t>
+            </a:r>
+          </a:p>
+        </p:txBody>
+      </p:sp>
+      <p:sp>
+        <p:nvSpPr>
+          <p:cNvPr id="3" name="Marcador de contenido 2">
+            <a:extLst>
+              <a:ext uri="{FF2B5EF4-FFF2-40B4-BE49-F238E27FC236}">
+                <a16:creationId xmlns:a16="http://schemas.microsoft.com/office/drawing/2014/main" id="{1E348AE6-C215-4051-9CA9-65E21916DC67}"/>
+              </a:ext>
+            </a:extLst>
+          </p:cNvPr>
+          <p:cNvSpPr>
+            <a:spLocks noGrp="1"/>
+          </p:cNvSpPr>
+          <p:nvPr>
+            <p:ph idx="1"/>
+          </p:nvPr>
+        </p:nvSpPr>
+        <p:spPr/>
+        <p:txBody>
+          <a:bodyPr/>
+          <a:lstStyle/>
+          <a:p>
+            <a:r>
+              <a:rPr lang="es-ES"/>
+              <a:t>Reuniones:</a:t>
+            </a:r>
+          </a:p>
+          <a:p>
+            <a:pPr lvl="1"/>
+            <a:r>
+              <a:rPr lang="es-ES"/>
+              <a:t>Tras la realización de determinadas tareas.</a:t>
+            </a:r>
+          </a:p>
+          <a:p>
+            <a:pPr lvl="1"/>
+            <a:r>
+              <a:rPr lang="es-ES"/>
+              <a:t>Tratarán diversos asuntos.</a:t>
+            </a:r>
+          </a:p>
+          <a:p>
+            <a:pPr lvl="1"/>
+            <a:r>
+              <a:rPr lang="es-ES"/>
+              <a:t>1 reunión -&gt; 1 acta de reunión.</a:t>
+            </a:r>
+          </a:p>
+          <a:p>
+            <a:r>
+              <a:rPr lang="es-ES"/>
+              <a:t>Email.</a:t>
+            </a:r>
+          </a:p>
+          <a:p>
+            <a:r>
+              <a:rPr lang="es-ES"/>
+              <a:t>Mensajería instantánea.</a:t>
+            </a:r>
+          </a:p>
+          <a:p>
+            <a:r>
+              <a:rPr lang="es-ES"/>
+              <a:t>Oral.</a:t>
+            </a:r>
+          </a:p>
+          <a:p>
+            <a:r>
+              <a:rPr lang="es-ES"/>
+              <a:t>Escrita.</a:t>
+            </a:r>
+          </a:p>
+        </p:txBody>
+      </p:sp>
+    </p:spTree>
+    <p:extLst>
+      <p:ext uri="{BB962C8B-B14F-4D97-AF65-F5344CB8AC3E}">
+        <p14:creationId xmlns:p14="http://schemas.microsoft.com/office/powerpoint/2010/main" val="1664954896"/>
+      </p:ext>
+    </p:extLst>
+  </p:cSld>
+  <p:clrMapOvr>
+    <a:masterClrMapping/>
+  </p:clrMapOvr>
+</p:sld>
+</file>
+
 <file path=ppt/slides/slide27.xml><?xml version="1.0" encoding="utf-8"?>
 <p:sld xmlns:a="http://schemas.openxmlformats.org/drawingml/2006/main" xmlns:r="http://schemas.openxmlformats.org/officeDocument/2006/relationships" xmlns:p="http://schemas.openxmlformats.org/presentationml/2006/main">
   <p:cSld>
@@ -13658,147 +12752,6 @@
       </p:grpSpPr>
       <p:sp>
         <p:nvSpPr>
-          <p:cNvPr id="4" name="Título 1">
-            <a:extLst>
-              <a:ext uri="{FF2B5EF4-FFF2-40B4-BE49-F238E27FC236}">
-                <a16:creationId xmlns:a16="http://schemas.microsoft.com/office/drawing/2014/main" id="{81D09D20-EFE2-40E7-AA64-5A0EE567079C}"/>
-              </a:ext>
-            </a:extLst>
-          </p:cNvPr>
-          <p:cNvSpPr>
-            <a:spLocks noGrp="1"/>
-          </p:cNvSpPr>
-          <p:nvPr>
-            <p:ph type="title"/>
-          </p:nvPr>
-        </p:nvSpPr>
-        <p:spPr/>
-        <p:txBody>
-          <a:bodyPr vert="horz" lIns="91440" tIns="45720" rIns="91440" bIns="45720" anchor="ctr">
-            <a:normAutofit/>
-          </a:bodyPr>
-          <a:lstStyle/>
-          <a:p>
-            <a:pPr algn="ctr"/>
-            <a:r>
-              <a:rPr lang="es-ES"/>
-              <a:t>Plan de Gestión de las</a:t>
-            </a:r>
-            <a:br>
-              <a:rPr lang="es-ES"/>
-            </a:br>
-            <a:r>
-              <a:rPr lang="es-ES"/>
-              <a:t>comunicaciones III: Tipos</a:t>
-            </a:r>
-          </a:p>
-        </p:txBody>
-      </p:sp>
-      <p:sp>
-        <p:nvSpPr>
-          <p:cNvPr id="3" name="Marcador de contenido 2">
-            <a:extLst>
-              <a:ext uri="{FF2B5EF4-FFF2-40B4-BE49-F238E27FC236}">
-                <a16:creationId xmlns:a16="http://schemas.microsoft.com/office/drawing/2014/main" id="{1E348AE6-C215-4051-9CA9-65E21916DC67}"/>
-              </a:ext>
-            </a:extLst>
-          </p:cNvPr>
-          <p:cNvSpPr>
-            <a:spLocks noGrp="1"/>
-          </p:cNvSpPr>
-          <p:nvPr>
-            <p:ph idx="1"/>
-          </p:nvPr>
-        </p:nvSpPr>
-        <p:spPr/>
-        <p:txBody>
-          <a:bodyPr/>
-          <a:lstStyle/>
-          <a:p>
-            <a:r>
-              <a:rPr lang="es-ES"/>
-              <a:t>Reuniones:</a:t>
-            </a:r>
-          </a:p>
-          <a:p>
-            <a:pPr lvl="1"/>
-            <a:r>
-              <a:rPr lang="es-ES"/>
-              <a:t>Tras la realización de determinadas tareas.</a:t>
-            </a:r>
-          </a:p>
-          <a:p>
-            <a:pPr lvl="1"/>
-            <a:r>
-              <a:rPr lang="es-ES"/>
-              <a:t>Tratarán diversos asuntos.</a:t>
-            </a:r>
-          </a:p>
-          <a:p>
-            <a:pPr lvl="1"/>
-            <a:r>
-              <a:rPr lang="es-ES"/>
-              <a:t>1 reunión -&gt; 1 acta de reunión.</a:t>
-            </a:r>
-          </a:p>
-          <a:p>
-            <a:r>
-              <a:rPr lang="es-ES"/>
-              <a:t>Email.</a:t>
-            </a:r>
-          </a:p>
-          <a:p>
-            <a:r>
-              <a:rPr lang="es-ES"/>
-              <a:t>Mensajería instantánea.</a:t>
-            </a:r>
-          </a:p>
-          <a:p>
-            <a:r>
-              <a:rPr lang="es-ES"/>
-              <a:t>Oral.</a:t>
-            </a:r>
-          </a:p>
-          <a:p>
-            <a:r>
-              <a:rPr lang="es-ES"/>
-              <a:t>Escrita.</a:t>
-            </a:r>
-          </a:p>
-        </p:txBody>
-      </p:sp>
-    </p:spTree>
-    <p:extLst>
-      <p:ext uri="{BB962C8B-B14F-4D97-AF65-F5344CB8AC3E}">
-        <p14:creationId xmlns:p14="http://schemas.microsoft.com/office/powerpoint/2010/main" val="1664954896"/>
-      </p:ext>
-    </p:extLst>
-  </p:cSld>
-  <p:clrMapOvr>
-    <a:masterClrMapping/>
-  </p:clrMapOvr>
-</p:sld>
-</file>
-
-<file path=ppt/slides/slide28.xml><?xml version="1.0" encoding="utf-8"?>
-<p:sld xmlns:a="http://schemas.openxmlformats.org/drawingml/2006/main" xmlns:r="http://schemas.openxmlformats.org/officeDocument/2006/relationships" xmlns:p="http://schemas.openxmlformats.org/presentationml/2006/main">
-  <p:cSld>
-    <p:spTree>
-      <p:nvGrpSpPr>
-        <p:cNvPr id="1" name=""/>
-        <p:cNvGrpSpPr/>
-        <p:nvPr/>
-      </p:nvGrpSpPr>
-      <p:grpSpPr>
-        <a:xfrm>
-          <a:off x="0" y="0"/>
-          <a:ext cx="0" cy="0"/>
-          <a:chOff x="0" y="0"/>
-          <a:chExt cx="0" cy="0"/>
-        </a:xfrm>
-      </p:grpSpPr>
-      <p:sp>
-        <p:nvSpPr>
           <p:cNvPr id="2" name="Título 1">
             <a:extLst>
               <a:ext uri="{FF2B5EF4-FFF2-40B4-BE49-F238E27FC236}">
@@ -13900,7 +12853,7 @@
 </p:sld>
 </file>
 
-<file path=ppt/slides/slide29.xml><?xml version="1.0" encoding="utf-8"?>
+<file path=ppt/slides/slide28.xml><?xml version="1.0" encoding="utf-8"?>
 <p:sld xmlns:a="http://schemas.openxmlformats.org/drawingml/2006/main" xmlns:r="http://schemas.openxmlformats.org/officeDocument/2006/relationships" xmlns:p="http://schemas.openxmlformats.org/presentationml/2006/main">
   <p:cSld>
     <p:spTree>
@@ -14012,102 +12965,7 @@
 </p:sld>
 </file>
 
-<file path=ppt/slides/slide3.xml><?xml version="1.0" encoding="utf-8"?>
-<p:sld xmlns:a="http://schemas.openxmlformats.org/drawingml/2006/main" xmlns:r="http://schemas.openxmlformats.org/officeDocument/2006/relationships" xmlns:p="http://schemas.openxmlformats.org/presentationml/2006/main">
-  <p:cSld>
-    <p:spTree>
-      <p:nvGrpSpPr>
-        <p:cNvPr id="1" name=""/>
-        <p:cNvGrpSpPr/>
-        <p:nvPr/>
-      </p:nvGrpSpPr>
-      <p:grpSpPr>
-        <a:xfrm>
-          <a:off x="0" y="0"/>
-          <a:ext cx="0" cy="0"/>
-          <a:chOff x="0" y="0"/>
-          <a:chExt cx="0" cy="0"/>
-        </a:xfrm>
-      </p:grpSpPr>
-      <p:sp>
-        <p:nvSpPr>
-          <p:cNvPr id="2" name="Título 1">
-            <a:extLst>
-              <a:ext uri="{FF2B5EF4-FFF2-40B4-BE49-F238E27FC236}">
-                <a16:creationId xmlns:a16="http://schemas.microsoft.com/office/drawing/2014/main" id="{CB4476DA-A3D7-485A-8127-9B2490D09D86}"/>
-              </a:ext>
-            </a:extLst>
-          </p:cNvPr>
-          <p:cNvSpPr>
-            <a:spLocks noGrp="1"/>
-          </p:cNvSpPr>
-          <p:nvPr>
-            <p:ph type="title"/>
-          </p:nvPr>
-        </p:nvSpPr>
-        <p:spPr>
-          <a:xfrm>
-            <a:off x="457200" y="725953"/>
-            <a:ext cx="4054479" cy="5943599"/>
-          </a:xfrm>
-        </p:spPr>
-        <p:txBody>
-          <a:bodyPr vert="horz" lIns="91440" tIns="45720" rIns="91440" bIns="45720" anchor="ctr">
-            <a:normAutofit/>
-          </a:bodyPr>
-          <a:lstStyle/>
-          <a:p>
-            <a:r>
-              <a:rPr lang="es-ES"/>
-              <a:t>Planificación del Proyecto (WBS)</a:t>
-            </a:r>
-          </a:p>
-        </p:txBody>
-      </p:sp>
-      <p:pic>
-        <p:nvPicPr>
-          <p:cNvPr id="4" name="Imagen 3">
-            <a:extLst>
-              <a:ext uri="{FF2B5EF4-FFF2-40B4-BE49-F238E27FC236}">
-                <a16:creationId xmlns:a16="http://schemas.microsoft.com/office/drawing/2014/main" id="{B604AC2F-F219-45E6-934B-EA3DF73577EA}"/>
-              </a:ext>
-            </a:extLst>
-          </p:cNvPr>
-          <p:cNvPicPr>
-            <a:picLocks noChangeAspect="1"/>
-          </p:cNvPicPr>
-          <p:nvPr/>
-        </p:nvPicPr>
-        <p:blipFill>
-          <a:blip r:embed="rId2"/>
-          <a:stretch>
-            <a:fillRect/>
-          </a:stretch>
-        </p:blipFill>
-        <p:spPr>
-          <a:xfrm>
-            <a:off x="4511679" y="725954"/>
-            <a:ext cx="4362275" cy="5943600"/>
-          </a:xfrm>
-          <a:prstGeom prst="rect">
-            <a:avLst/>
-          </a:prstGeom>
-        </p:spPr>
-      </p:pic>
-    </p:spTree>
-    <p:extLst>
-      <p:ext uri="{BB962C8B-B14F-4D97-AF65-F5344CB8AC3E}">
-        <p14:creationId xmlns:p14="http://schemas.microsoft.com/office/powerpoint/2010/main" val="1480342364"/>
-      </p:ext>
-    </p:extLst>
-  </p:cSld>
-  <p:clrMapOvr>
-    <a:masterClrMapping/>
-  </p:clrMapOvr>
-</p:sld>
-</file>
-
-<file path=ppt/slides/slide30.xml><?xml version="1.0" encoding="utf-8"?>
+<file path=ppt/slides/slide29.xml><?xml version="1.0" encoding="utf-8"?>
 <p:sld xmlns:a="http://schemas.openxmlformats.org/drawingml/2006/main" xmlns:r="http://schemas.openxmlformats.org/officeDocument/2006/relationships" xmlns:p="http://schemas.openxmlformats.org/presentationml/2006/main">
   <p:cSld>
     <p:spTree>
@@ -14202,7 +13060,7 @@
 </p:sld>
 </file>
 
-<file path=ppt/slides/slide31.xml><?xml version="1.0" encoding="utf-8"?>
+<file path=ppt/slides/slide3.xml><?xml version="1.0" encoding="utf-8"?>
 <p:sld xmlns:a="http://schemas.openxmlformats.org/drawingml/2006/main" xmlns:r="http://schemas.openxmlformats.org/officeDocument/2006/relationships" xmlns:p="http://schemas.openxmlformats.org/presentationml/2006/main">
   <p:cSld>
     <p:spTree>
@@ -14224,7 +13082,7 @@
           <p:cNvPr id="2" name="Título 1">
             <a:extLst>
               <a:ext uri="{FF2B5EF4-FFF2-40B4-BE49-F238E27FC236}">
-                <a16:creationId xmlns:a16="http://schemas.microsoft.com/office/drawing/2014/main" id="{293F4DDA-9311-43F7-86A4-A0DD651FFC03}"/>
+                <a16:creationId xmlns:a16="http://schemas.microsoft.com/office/drawing/2014/main" id="{CB4476DA-A3D7-485A-8127-9B2490D09D86}"/>
               </a:ext>
             </a:extLst>
           </p:cNvPr>
@@ -14235,104 +13093,59 @@
             <p:ph type="title"/>
           </p:nvPr>
         </p:nvSpPr>
-        <p:spPr/>
-        <p:txBody>
-          <a:bodyPr/>
+        <p:spPr>
+          <a:xfrm>
+            <a:off x="457200" y="725953"/>
+            <a:ext cx="4054479" cy="5943599"/>
+          </a:xfrm>
+        </p:spPr>
+        <p:txBody>
+          <a:bodyPr vert="horz" lIns="91440" tIns="45720" rIns="91440" bIns="45720" anchor="ctr">
+            <a:normAutofit/>
+          </a:bodyPr>
           <a:lstStyle/>
           <a:p>
             <a:r>
-              <a:rPr lang="es-ES"/>
-              <a:t>Estudio de alternativas</a:t>
-            </a:r>
-          </a:p>
-        </p:txBody>
-      </p:sp>
-      <p:sp>
-        <p:nvSpPr>
-          <p:cNvPr id="3" name="Marcador de contenido 2">
+              <a:rPr lang="es-ES" dirty="0"/>
+              <a:t>Planificación del Proyecto</a:t>
+            </a:r>
+          </a:p>
+        </p:txBody>
+      </p:sp>
+      <p:pic>
+        <p:nvPicPr>
+          <p:cNvPr id="5" name="Imagen 4">
             <a:extLst>
               <a:ext uri="{FF2B5EF4-FFF2-40B4-BE49-F238E27FC236}">
-                <a16:creationId xmlns:a16="http://schemas.microsoft.com/office/drawing/2014/main" id="{BF959778-07AC-4961-9C6C-9DEF5E3ACB6C}"/>
+                <a16:creationId xmlns:a16="http://schemas.microsoft.com/office/drawing/2014/main" id="{1B410DFC-3E6B-4A6E-A308-669DC9243412}"/>
               </a:ext>
             </a:extLst>
           </p:cNvPr>
-          <p:cNvSpPr>
-            <a:spLocks noGrp="1"/>
-          </p:cNvSpPr>
-          <p:nvPr>
-            <p:ph idx="1"/>
-          </p:nvPr>
-        </p:nvSpPr>
+          <p:cNvPicPr>
+            <a:picLocks noChangeAspect="1"/>
+          </p:cNvPicPr>
+          <p:nvPr/>
+        </p:nvPicPr>
+        <p:blipFill>
+          <a:blip r:embed="rId2"/>
+          <a:stretch>
+            <a:fillRect/>
+          </a:stretch>
+        </p:blipFill>
         <p:spPr>
           <a:xfrm>
-            <a:off x="457200" y="2071871"/>
-            <a:ext cx="8229600" cy="4325112"/>
+            <a:off x="4349262" y="0"/>
+            <a:ext cx="4794738" cy="6858000"/>
           </a:xfrm>
+          <a:prstGeom prst="rect">
+            <a:avLst/>
+          </a:prstGeom>
         </p:spPr>
-        <p:txBody>
-          <a:bodyPr>
-            <a:normAutofit/>
-          </a:bodyPr>
-          <a:lstStyle/>
-          <a:p>
-            <a:r>
-              <a:rPr lang="es-ES"/>
-              <a:t>Uso de Python como lenguaje de programación</a:t>
-            </a:r>
-          </a:p>
-          <a:p>
-            <a:r>
-              <a:rPr lang="es-ES"/>
-              <a:t>Adquirir equipos con mayor potencia.</a:t>
-            </a:r>
-          </a:p>
-          <a:p>
-            <a:r>
-              <a:rPr lang="es-ES"/>
-              <a:t>No realizar la integración con el sistema de información actual existente del contratante.</a:t>
-            </a:r>
-          </a:p>
-          <a:p>
-            <a:r>
-              <a:rPr lang="es-ES"/>
-              <a:t>Uso de bases de datos en vez de los </a:t>
-            </a:r>
-            <a:r>
-              <a:rPr lang="es-ES" err="1"/>
-              <a:t>PODs</a:t>
-            </a:r>
-            <a:r>
-              <a:rPr lang="es-ES"/>
-              <a:t> de SOLID.</a:t>
-            </a:r>
-          </a:p>
-          <a:p>
-            <a:r>
-              <a:rPr lang="es-ES"/>
-              <a:t>No contratar al consultor de tecnologías.</a:t>
-            </a:r>
-          </a:p>
-          <a:p>
-            <a:r>
-              <a:rPr lang="es-ES"/>
-              <a:t>Las reuniones de seguimiento tienen lugar cada 2 semanas.</a:t>
-            </a:r>
-          </a:p>
-          <a:p>
-            <a:r>
-              <a:rPr lang="es-ES"/>
-              <a:t>Utilizar a los programadores expertos que han desarrollado el proyecto como formadores.</a:t>
-            </a:r>
-          </a:p>
-          <a:p>
-            <a:endParaRPr lang="es-ES"/>
-          </a:p>
-        </p:txBody>
-      </p:sp>
+      </p:pic>
     </p:spTree>
     <p:extLst>
       <p:ext uri="{BB962C8B-B14F-4D97-AF65-F5344CB8AC3E}">
-        <p14:creationId xmlns:p14="http://schemas.microsoft.com/office/powerpoint/2010/main" val="4175259009"/>
+        <p14:creationId xmlns:p14="http://schemas.microsoft.com/office/powerpoint/2010/main" val="1480342364"/>
       </p:ext>
     </p:extLst>
   </p:cSld>
@@ -14342,7 +13155,7 @@
 </p:sld>
 </file>
 
-<file path=ppt/slides/slide32.xml><?xml version="1.0" encoding="utf-8"?>
+<file path=ppt/slides/slide30.xml><?xml version="1.0" encoding="utf-8"?>
 <p:sld xmlns:a="http://schemas.openxmlformats.org/drawingml/2006/main" xmlns:r="http://schemas.openxmlformats.org/officeDocument/2006/relationships" xmlns:p="http://schemas.openxmlformats.org/presentationml/2006/main">
   <p:cSld>
     <p:spTree>
@@ -14361,159 +13174,110 @@
       </p:grpSpPr>
       <p:sp>
         <p:nvSpPr>
-          <p:cNvPr id="5" name="4 Rectángulo"/>
-          <p:cNvSpPr/>
-          <p:nvPr/>
-        </p:nvSpPr>
-        <p:spPr>
-          <a:xfrm>
-            <a:off x="3123528" y="2967335"/>
-            <a:ext cx="2896947" cy="923330"/>
-          </a:xfrm>
-          <a:prstGeom prst="rect">
-            <a:avLst/>
-          </a:prstGeom>
-          <a:noFill/>
-          <a:effectLst>
-            <a:outerShdw blurRad="50800" dist="114300" dir="2700000" algn="tl" rotWithShape="0">
-              <a:prstClr val="black">
-                <a:alpha val="17000"/>
-              </a:prstClr>
-            </a:outerShdw>
-            <a:reflection stA="63000" endPos="65000" dist="12700" dir="5400000" sy="-100000" algn="bl" rotWithShape="0"/>
-          </a:effectLst>
-        </p:spPr>
-        <p:txBody>
-          <a:bodyPr wrap="none" lIns="91440" tIns="45720" rIns="91440" bIns="45720" anchor="t">
-            <a:spAutoFit/>
-            <a:scene3d>
-              <a:camera prst="orthographicFront"/>
-              <a:lightRig rig="flat" dir="tl">
-                <a:rot lat="0" lon="0" rev="6600000"/>
-              </a:lightRig>
-            </a:scene3d>
-            <a:sp3d extrusionH="25400" contourW="8890">
-              <a:bevelT w="38100" h="31750"/>
-              <a:contourClr>
-                <a:schemeClr val="accent2">
-                  <a:shade val="75000"/>
-                </a:schemeClr>
-              </a:contourClr>
-            </a:sp3d>
-          </a:bodyPr>
-          <a:lstStyle/>
-          <a:p>
-            <a:pPr algn="ctr"/>
-            <a:r>
-              <a:rPr lang="es-ES" sz="5400" b="1">
-                <a:ln w="11430"/>
-                <a:gradFill>
-                  <a:gsLst>
-                    <a:gs pos="0">
-                      <a:schemeClr val="accent2">
-                        <a:tint val="70000"/>
-                        <a:satMod val="245000"/>
-                      </a:schemeClr>
-                    </a:gs>
-                    <a:gs pos="75000">
-                      <a:schemeClr val="accent2">
-                        <a:tint val="90000"/>
-                        <a:shade val="60000"/>
-                        <a:satMod val="240000"/>
-                      </a:schemeClr>
-                    </a:gs>
-                    <a:gs pos="100000">
-                      <a:schemeClr val="accent2">
-                        <a:tint val="100000"/>
-                        <a:shade val="50000"/>
-                        <a:satMod val="240000"/>
-                      </a:schemeClr>
-                    </a:gs>
-                  </a:gsLst>
-                  <a:lin ang="5400000"/>
-                </a:gradFill>
-                <a:effectLst>
-                  <a:outerShdw blurRad="50800" dist="39000" dir="5460000" algn="tl">
-                    <a:srgbClr val="000000">
-                      <a:alpha val="38000"/>
-                    </a:srgbClr>
-                  </a:outerShdw>
-                </a:effectLst>
-              </a:rPr>
-              <a:t>Gracias</a:t>
-            </a:r>
-            <a:endParaRPr lang="es-ES" sz="5400" b="1" cap="none" spc="0">
-              <a:ln w="11430"/>
-              <a:gradFill>
-                <a:gsLst>
-                  <a:gs pos="0">
-                    <a:schemeClr val="accent2">
-                      <a:tint val="70000"/>
-                      <a:satMod val="245000"/>
-                    </a:schemeClr>
-                  </a:gs>
-                  <a:gs pos="75000">
-                    <a:schemeClr val="accent2">
-                      <a:tint val="90000"/>
-                      <a:shade val="60000"/>
-                      <a:satMod val="240000"/>
-                    </a:schemeClr>
-                  </a:gs>
-                  <a:gs pos="100000">
-                    <a:schemeClr val="accent2">
-                      <a:tint val="100000"/>
-                      <a:shade val="50000"/>
-                      <a:satMod val="240000"/>
-                    </a:schemeClr>
-                  </a:gs>
-                </a:gsLst>
-                <a:lin ang="5400000"/>
-              </a:gradFill>
-              <a:effectLst>
-                <a:outerShdw blurRad="50800" dist="39000" dir="5460000" algn="tl">
-                  <a:srgbClr val="000000">
-                    <a:alpha val="38000"/>
-                  </a:srgbClr>
-                </a:outerShdw>
-              </a:effectLst>
-            </a:endParaRPr>
-          </a:p>
-        </p:txBody>
-      </p:sp>
-      <p:pic>
-        <p:nvPicPr>
-          <p:cNvPr id="8" name="Imagen 7">
+          <p:cNvPr id="2" name="Título 1">
             <a:extLst>
               <a:ext uri="{FF2B5EF4-FFF2-40B4-BE49-F238E27FC236}">
-                <a16:creationId xmlns:a16="http://schemas.microsoft.com/office/drawing/2014/main" id="{82CABA34-E760-4606-A4CA-3C896B8D616B}"/>
+                <a16:creationId xmlns:a16="http://schemas.microsoft.com/office/drawing/2014/main" id="{293F4DDA-9311-43F7-86A4-A0DD651FFC03}"/>
               </a:ext>
             </a:extLst>
           </p:cNvPr>
-          <p:cNvPicPr>
-            <a:picLocks noChangeAspect="1"/>
-          </p:cNvPicPr>
-          <p:nvPr/>
-        </p:nvPicPr>
-        <p:blipFill>
-          <a:blip r:embed="rId3"/>
-          <a:stretch>
-            <a:fillRect/>
-          </a:stretch>
-        </p:blipFill>
+          <p:cNvSpPr>
+            <a:spLocks noGrp="1"/>
+          </p:cNvSpPr>
+          <p:nvPr>
+            <p:ph type="title"/>
+          </p:nvPr>
+        </p:nvSpPr>
+        <p:spPr/>
+        <p:txBody>
+          <a:bodyPr/>
+          <a:lstStyle/>
+          <a:p>
+            <a:r>
+              <a:rPr lang="es-ES"/>
+              <a:t>Estudio de alternativas</a:t>
+            </a:r>
+          </a:p>
+        </p:txBody>
+      </p:sp>
+      <p:sp>
+        <p:nvSpPr>
+          <p:cNvPr id="3" name="Marcador de contenido 2">
+            <a:extLst>
+              <a:ext uri="{FF2B5EF4-FFF2-40B4-BE49-F238E27FC236}">
+                <a16:creationId xmlns:a16="http://schemas.microsoft.com/office/drawing/2014/main" id="{BF959778-07AC-4961-9C6C-9DEF5E3ACB6C}"/>
+              </a:ext>
+            </a:extLst>
+          </p:cNvPr>
+          <p:cNvSpPr>
+            <a:spLocks noGrp="1"/>
+          </p:cNvSpPr>
+          <p:nvPr>
+            <p:ph idx="1"/>
+          </p:nvPr>
+        </p:nvSpPr>
         <p:spPr>
           <a:xfrm>
-            <a:off x="6020475" y="4161835"/>
-            <a:ext cx="819222" cy="576489"/>
+            <a:off x="457200" y="2071871"/>
+            <a:ext cx="8229600" cy="4325112"/>
           </a:xfrm>
-          <a:prstGeom prst="rect">
-            <a:avLst/>
-          </a:prstGeom>
         </p:spPr>
-      </p:pic>
+        <p:txBody>
+          <a:bodyPr>
+            <a:normAutofit/>
+          </a:bodyPr>
+          <a:lstStyle/>
+          <a:p>
+            <a:r>
+              <a:rPr lang="es-ES" dirty="0"/>
+              <a:t>Uso de Python como lenguaje de programación</a:t>
+            </a:r>
+          </a:p>
+          <a:p>
+            <a:r>
+              <a:rPr lang="es-ES" dirty="0"/>
+              <a:t>Adquirir equipos con mayor potencia.</a:t>
+            </a:r>
+          </a:p>
+          <a:p>
+            <a:r>
+              <a:rPr lang="es-ES" dirty="0"/>
+              <a:t>No realizar la integración con el sistema de información actual existente del contratante.</a:t>
+            </a:r>
+          </a:p>
+          <a:p>
+            <a:r>
+              <a:rPr lang="es-ES" dirty="0"/>
+              <a:t>Uso de NFC en lugar de Bluetooth.</a:t>
+            </a:r>
+          </a:p>
+          <a:p>
+            <a:r>
+              <a:rPr lang="es-ES" dirty="0"/>
+              <a:t>No contratar al consultor de tecnologías.</a:t>
+            </a:r>
+          </a:p>
+          <a:p>
+            <a:r>
+              <a:rPr lang="es-ES" dirty="0"/>
+              <a:t>Las reuniones de seguimiento tienen lugar cada 2 semanas.</a:t>
+            </a:r>
+          </a:p>
+          <a:p>
+            <a:r>
+              <a:rPr lang="es-ES" dirty="0"/>
+              <a:t>Utilizar a los programadores expertos que han desarrollado el proyecto como formadores.</a:t>
+            </a:r>
+          </a:p>
+          <a:p>
+            <a:endParaRPr lang="es-ES" dirty="0"/>
+          </a:p>
+        </p:txBody>
+      </p:sp>
     </p:spTree>
     <p:extLst>
       <p:ext uri="{BB962C8B-B14F-4D97-AF65-F5344CB8AC3E}">
-        <p14:creationId xmlns:p14="http://schemas.microsoft.com/office/powerpoint/2010/main" val="3986508307"/>
+        <p14:creationId xmlns:p14="http://schemas.microsoft.com/office/powerpoint/2010/main" val="4175259009"/>
       </p:ext>
     </p:extLst>
   </p:cSld>
@@ -14565,8 +13329,8 @@
           <a:p>
             <a:pPr algn="ctr"/>
             <a:r>
-              <a:rPr lang="es-ES"/>
-              <a:t>Planificación del Proyecto (WBS): Recursos</a:t>
+              <a:rPr lang="es-ES" dirty="0"/>
+              <a:t>Planificación del Proyecto: Recursos</a:t>
             </a:r>
           </a:p>
         </p:txBody>
@@ -14696,8 +13460,8 @@
           <a:p>
             <a:pPr algn="ctr"/>
             <a:r>
-              <a:rPr lang="es-ES"/>
-              <a:t>Planificación del Proyecto (WBS): Reuniones y Actas</a:t>
+              <a:rPr lang="es-ES" dirty="0"/>
+              <a:t>Planificación del Proyecto: Reuniones y Actas</a:t>
             </a:r>
           </a:p>
         </p:txBody>
@@ -14836,8 +13600,8 @@
           <a:lstStyle/>
           <a:p>
             <a:r>
-              <a:rPr lang="es-ES"/>
-              <a:t>Estructura del equipo (OBS)</a:t>
+              <a:rPr lang="es-ES" dirty="0"/>
+              <a:t>Estructura del equipo</a:t>
             </a:r>
           </a:p>
         </p:txBody>
@@ -14858,7 +13622,7 @@
             <p:ph idx="1"/>
             <p:extLst>
               <p:ext uri="{D42A27DB-BD31-4B8C-83A1-F6EECF244321}">
-                <p14:modId xmlns:p14="http://schemas.microsoft.com/office/powerpoint/2010/main" val="2733262437"/>
+                <p14:modId xmlns:p14="http://schemas.microsoft.com/office/powerpoint/2010/main" val="3566989568"/>
               </p:ext>
             </p:extLst>
           </p:nvPr>
@@ -15587,12 +14351,12 @@
                     <a:lstStyle/>
                     <a:p>
                       <a:r>
-                        <a:rPr lang="es-ES" sz="1100">
+                        <a:rPr lang="es-ES" sz="1100" dirty="0">
                           <a:effectLst/>
                         </a:rPr>
-                        <a:t>Desarrollo módulos (excepto PODS e integración)</a:t>
+                        <a:t>Desarrollo módulos (excepto integración)</a:t>
                       </a:r>
-                      <a:endParaRPr lang="es-ES" sz="1100">
+                      <a:endParaRPr lang="es-ES" sz="1100" dirty="0">
                         <a:effectLst/>
                         <a:latin typeface="Calibri" panose="020F0502020204030204" pitchFamily="34" charset="0"/>
                         <a:ea typeface="Yu Mincho" panose="02020400000000000000" pitchFamily="18" charset="-128"/>
@@ -15769,12 +14533,12 @@
                     <a:lstStyle/>
                     <a:p>
                       <a:r>
-                        <a:rPr lang="es-ES" sz="1100">
+                        <a:rPr lang="es-ES" sz="1100" dirty="0">
                           <a:effectLst/>
                         </a:rPr>
-                        <a:t>Desarrollo Módulo de PODS clínico</a:t>
+                        <a:t>Desarrollo Módulo de Bluetooth</a:t>
                       </a:r>
-                      <a:endParaRPr lang="es-ES" sz="1100">
+                      <a:endParaRPr lang="es-ES" sz="1100" dirty="0">
                         <a:effectLst/>
                         <a:latin typeface="Calibri" panose="020F0502020204030204" pitchFamily="34" charset="0"/>
                         <a:ea typeface="Yu Mincho" panose="02020400000000000000" pitchFamily="18" charset="-128"/>
@@ -16105,12 +14869,12 @@
                     <a:p>
                       <a:pPr algn="ctr"/>
                       <a:r>
-                        <a:rPr lang="es-ES" sz="1100">
+                        <a:rPr lang="es-ES" sz="1100" dirty="0">
                           <a:effectLst/>
                         </a:rPr>
                         <a:t> </a:t>
                       </a:r>
-                      <a:endParaRPr lang="es-ES" sz="1100">
+                      <a:endParaRPr lang="es-ES" sz="1100" dirty="0">
                         <a:effectLst/>
                         <a:latin typeface="Calibri" panose="020F0502020204030204" pitchFamily="34" charset="0"/>
                         <a:ea typeface="Yu Mincho" panose="02020400000000000000" pitchFamily="18" charset="-128"/>
@@ -16162,229 +14926,6 @@
       </p:grpSpPr>
       <p:sp>
         <p:nvSpPr>
-          <p:cNvPr id="2" name="Título 1">
-            <a:extLst>
-              <a:ext uri="{FF2B5EF4-FFF2-40B4-BE49-F238E27FC236}">
-                <a16:creationId xmlns:a16="http://schemas.microsoft.com/office/drawing/2014/main" id="{CB4476DA-A3D7-485A-8127-9B2490D09D86}"/>
-              </a:ext>
-            </a:extLst>
-          </p:cNvPr>
-          <p:cNvSpPr>
-            <a:spLocks noGrp="1"/>
-          </p:cNvSpPr>
-          <p:nvPr>
-            <p:ph type="title"/>
-          </p:nvPr>
-        </p:nvSpPr>
-        <p:spPr/>
-        <p:txBody>
-          <a:bodyPr vert="horz" lIns="91440" tIns="45720" rIns="91440" bIns="45720" anchor="ctr">
-            <a:normAutofit/>
-          </a:bodyPr>
-          <a:lstStyle/>
-          <a:p>
-            <a:r>
-              <a:rPr lang="es-ES"/>
-              <a:t>Productos (PBS)</a:t>
-            </a:r>
-          </a:p>
-        </p:txBody>
-      </p:sp>
-      <p:sp>
-        <p:nvSpPr>
-          <p:cNvPr id="26" name="Text Placeholder 2">
-            <a:extLst>
-              <a:ext uri="{FF2B5EF4-FFF2-40B4-BE49-F238E27FC236}">
-                <a16:creationId xmlns:a16="http://schemas.microsoft.com/office/drawing/2014/main" id="{E6A1B877-ED5D-4389-9822-72B368EB1478}"/>
-              </a:ext>
-            </a:extLst>
-          </p:cNvPr>
-          <p:cNvSpPr>
-            <a:spLocks noGrp="1"/>
-          </p:cNvSpPr>
-          <p:nvPr>
-            <p:ph type="body" idx="1"/>
-          </p:nvPr>
-        </p:nvSpPr>
-        <p:spPr/>
-        <p:txBody>
-          <a:bodyPr vert="horz" lIns="91440" tIns="45720" rIns="91440" bIns="45720" anchor="ctr">
-            <a:noAutofit/>
-          </a:bodyPr>
-          <a:lstStyle/>
-          <a:p>
-            <a:r>
-              <a:rPr lang="en-US" sz="1600" err="1"/>
-              <a:t>Descomposición</a:t>
-            </a:r>
-            <a:r>
-              <a:rPr lang="en-US" sz="1600"/>
-              <a:t> </a:t>
-            </a:r>
-            <a:r>
-              <a:rPr lang="en-US" sz="1600" err="1"/>
-              <a:t>jerárquica</a:t>
-            </a:r>
-            <a:r>
-              <a:rPr lang="en-US" sz="1600"/>
-              <a:t> de los </a:t>
-            </a:r>
-            <a:r>
-              <a:rPr lang="en-US" sz="1600" err="1"/>
-              <a:t>entregables</a:t>
-            </a:r>
-            <a:r>
-              <a:rPr lang="en-US" sz="1600"/>
-              <a:t> del </a:t>
-            </a:r>
-            <a:r>
-              <a:rPr lang="en-US" sz="1600" err="1"/>
-              <a:t>proyecto</a:t>
-            </a:r>
-            <a:endParaRPr lang="en-US" sz="1600"/>
-          </a:p>
-        </p:txBody>
-      </p:sp>
-      <p:sp>
-        <p:nvSpPr>
-          <p:cNvPr id="28" name="Text Placeholder 3">
-            <a:extLst>
-              <a:ext uri="{FF2B5EF4-FFF2-40B4-BE49-F238E27FC236}">
-                <a16:creationId xmlns:a16="http://schemas.microsoft.com/office/drawing/2014/main" id="{9FE43FFD-8918-4152-9169-D8AF0A5C35F8}"/>
-              </a:ext>
-            </a:extLst>
-          </p:cNvPr>
-          <p:cNvSpPr>
-            <a:spLocks noGrp="1"/>
-          </p:cNvSpPr>
-          <p:nvPr>
-            <p:ph type="body" sz="half" idx="3"/>
-          </p:nvPr>
-        </p:nvSpPr>
-        <p:spPr/>
-        <p:txBody>
-          <a:bodyPr/>
-          <a:lstStyle/>
-          <a:p>
-            <a:r>
-              <a:rPr lang="en-US" sz="1600" err="1"/>
-              <a:t>Descomposición</a:t>
-            </a:r>
-            <a:r>
-              <a:rPr lang="en-US" sz="1600"/>
-              <a:t> de los </a:t>
-            </a:r>
-            <a:r>
-              <a:rPr lang="en-US" sz="1600" err="1"/>
-              <a:t>módulos</a:t>
-            </a:r>
-            <a:r>
-              <a:rPr lang="en-US" sz="1600"/>
-              <a:t> de software</a:t>
-            </a:r>
-          </a:p>
-        </p:txBody>
-      </p:sp>
-      <p:pic>
-        <p:nvPicPr>
-          <p:cNvPr id="8" name="Marcador de contenido 7">
-            <a:extLst>
-              <a:ext uri="{FF2B5EF4-FFF2-40B4-BE49-F238E27FC236}">
-                <a16:creationId xmlns:a16="http://schemas.microsoft.com/office/drawing/2014/main" id="{DE6FDE8C-F866-4E32-86D7-A399C3E6E65B}"/>
-              </a:ext>
-            </a:extLst>
-          </p:cNvPr>
-          <p:cNvPicPr>
-            <a:picLocks noGrp="1"/>
-          </p:cNvPicPr>
-          <p:nvPr>
-            <p:ph sz="quarter" idx="2"/>
-          </p:nvPr>
-        </p:nvPicPr>
-        <p:blipFill>
-          <a:blip r:embed="rId2">
-            <a:extLst>
-              <a:ext uri="{28A0092B-C50C-407E-A947-70E740481C1C}">
-                <a14:useLocalDpi xmlns:a14="http://schemas.microsoft.com/office/drawing/2010/main" val="0"/>
-              </a:ext>
-            </a:extLst>
-          </a:blip>
-          <a:stretch>
-            <a:fillRect/>
-          </a:stretch>
-        </p:blipFill>
-        <p:spPr>
-          <a:xfrm>
-            <a:off x="582083" y="3190523"/>
-            <a:ext cx="3287183" cy="2219677"/>
-          </a:xfrm>
-          <a:prstGeom prst="rect">
-            <a:avLst/>
-          </a:prstGeom>
-        </p:spPr>
-      </p:pic>
-      <p:pic>
-        <p:nvPicPr>
-          <p:cNvPr id="16" name="Imagen 15">
-            <a:extLst>
-              <a:ext uri="{FF2B5EF4-FFF2-40B4-BE49-F238E27FC236}">
-                <a16:creationId xmlns:a16="http://schemas.microsoft.com/office/drawing/2014/main" id="{0815A526-8D18-4537-831E-243DC5C3DE5A}"/>
-              </a:ext>
-            </a:extLst>
-          </p:cNvPr>
-          <p:cNvPicPr>
-            <a:picLocks noChangeAspect="1"/>
-          </p:cNvPicPr>
-          <p:nvPr/>
-        </p:nvPicPr>
-        <p:blipFill>
-          <a:blip r:embed="rId3"/>
-          <a:stretch>
-            <a:fillRect/>
-          </a:stretch>
-        </p:blipFill>
-        <p:spPr>
-          <a:xfrm>
-            <a:off x="4609951" y="3603875"/>
-            <a:ext cx="4534049" cy="1865591"/>
-          </a:xfrm>
-          <a:prstGeom prst="rect">
-            <a:avLst/>
-          </a:prstGeom>
-        </p:spPr>
-      </p:pic>
-    </p:spTree>
-    <p:extLst>
-      <p:ext uri="{BB962C8B-B14F-4D97-AF65-F5344CB8AC3E}">
-        <p14:creationId xmlns:p14="http://schemas.microsoft.com/office/powerpoint/2010/main" val="1965257342"/>
-      </p:ext>
-    </p:extLst>
-  </p:cSld>
-  <p:clrMapOvr>
-    <a:masterClrMapping/>
-  </p:clrMapOvr>
-</p:sld>
-</file>
-
-<file path=ppt/slides/slide8.xml><?xml version="1.0" encoding="utf-8"?>
-<p:sld xmlns:a="http://schemas.openxmlformats.org/drawingml/2006/main" xmlns:r="http://schemas.openxmlformats.org/officeDocument/2006/relationships" xmlns:p="http://schemas.openxmlformats.org/presentationml/2006/main">
-  <p:cSld>
-    <p:spTree>
-      <p:nvGrpSpPr>
-        <p:cNvPr id="1" name=""/>
-        <p:cNvGrpSpPr/>
-        <p:nvPr/>
-      </p:nvGrpSpPr>
-      <p:grpSpPr>
-        <a:xfrm>
-          <a:off x="0" y="0"/>
-          <a:ext cx="0" cy="0"/>
-          <a:chOff x="0" y="0"/>
-          <a:chExt cx="0" cy="0"/>
-        </a:xfrm>
-      </p:grpSpPr>
-      <p:sp>
-        <p:nvSpPr>
           <p:cNvPr id="62" name="Rectangle 61">
             <a:extLst>
               <a:ext uri="{FF2B5EF4-FFF2-40B4-BE49-F238E27FC236}">
@@ -17662,7 +16203,7 @@
 </p:sld>
 </file>
 
-<file path=ppt/slides/slide9.xml><?xml version="1.0" encoding="utf-8"?>
+<file path=ppt/slides/slide8.xml><?xml version="1.0" encoding="utf-8"?>
 <p:sld xmlns:a="http://schemas.openxmlformats.org/drawingml/2006/main" xmlns:r="http://schemas.openxmlformats.org/officeDocument/2006/relationships" xmlns:p="http://schemas.openxmlformats.org/presentationml/2006/main">
   <p:cSld>
     <p:spTree>
@@ -17879,7 +16420,7 @@
           <a:p>
             <a:pPr algn="ctr"/>
             <a:r>
-              <a:rPr lang="en-US" sz="1000">
+              <a:rPr lang="en-US" sz="1000" dirty="0">
                 <a:solidFill>
                   <a:srgbClr val="424456"/>
                 </a:solidFill>
@@ -17889,7 +16430,7 @@
               <a:t>App </a:t>
             </a:r>
             <a:r>
-              <a:rPr lang="en-US" sz="1000" err="1">
+              <a:rPr lang="en-US" sz="1000" dirty="0" err="1">
                 <a:solidFill>
                   <a:srgbClr val="424456"/>
                 </a:solidFill>
@@ -17899,7 +16440,7 @@
               <a:t>móvil</a:t>
             </a:r>
             <a:r>
-              <a:rPr lang="en-US" sz="1000">
+              <a:rPr lang="en-US" sz="1000" dirty="0">
                 <a:solidFill>
                   <a:srgbClr val="424456"/>
                 </a:solidFill>
@@ -17909,7 +16450,7 @@
               <a:t>: </a:t>
             </a:r>
             <a:r>
-              <a:rPr lang="en-US" sz="1000" err="1">
+              <a:rPr lang="en-US" sz="1000" dirty="0" err="1">
                 <a:solidFill>
                   <a:srgbClr val="424456"/>
                 </a:solidFill>
@@ -17919,7 +16460,7 @@
               <a:t>Gestión</a:t>
             </a:r>
             <a:r>
-              <a:rPr lang="en-US" sz="1000">
+              <a:rPr lang="en-US" sz="1000" dirty="0">
                 <a:solidFill>
                   <a:srgbClr val="424456"/>
                 </a:solidFill>
@@ -17929,7 +16470,7 @@
               <a:t> del </a:t>
             </a:r>
             <a:r>
-              <a:rPr lang="en-US" sz="1000" err="1">
+              <a:rPr lang="en-US" sz="1000" dirty="0" err="1">
                 <a:solidFill>
                   <a:srgbClr val="424456"/>
                 </a:solidFill>
@@ -17938,27 +16479,7 @@
               </a:rPr>
               <a:t>transporte</a:t>
             </a:r>
-            <a:r>
-              <a:rPr lang="en-US" sz="1000">
-                <a:solidFill>
-                  <a:srgbClr val="424456"/>
-                </a:solidFill>
-                <a:ea typeface="+mn-lt"/>
-                <a:cs typeface="+mn-lt"/>
-              </a:rPr>
-              <a:t> </a:t>
-            </a:r>
-            <a:r>
-              <a:rPr lang="en-US" sz="1000" err="1">
-                <a:solidFill>
-                  <a:srgbClr val="424456"/>
-                </a:solidFill>
-                <a:ea typeface="+mn-lt"/>
-                <a:cs typeface="+mn-lt"/>
-              </a:rPr>
-              <a:t>asistencial</a:t>
-            </a:r>
-            <a:endParaRPr lang="en-US" sz="1000">
+            <a:endParaRPr lang="en-US" sz="1000" dirty="0">
               <a:solidFill>
                 <a:srgbClr val="424456"/>
               </a:solidFill>
@@ -18103,26 +16624,16 @@
           <a:p>
             <a:pPr algn="ctr"/>
             <a:r>
-              <a:rPr lang="en-US" sz="1000">
+              <a:rPr lang="en-US" sz="1000" dirty="0">
                 <a:solidFill>
                   <a:srgbClr val="424456"/>
                 </a:solidFill>
                 <a:ea typeface="+mn-lt"/>
                 <a:cs typeface="+mn-lt"/>
               </a:rPr>
-              <a:t>PODS </a:t>
-            </a:r>
-            <a:r>
-              <a:rPr lang="en-US" sz="1000" err="1">
-                <a:solidFill>
-                  <a:srgbClr val="424456"/>
-                </a:solidFill>
-                <a:ea typeface="+mn-lt"/>
-                <a:cs typeface="+mn-lt"/>
-              </a:rPr>
-              <a:t>Clínicos</a:t>
-            </a:r>
-            <a:endParaRPr lang="en-US">
+              <a:t>Bluetooth</a:t>
+            </a:r>
+            <a:endParaRPr lang="en-US" dirty="0">
               <a:solidFill>
                 <a:srgbClr val="424456"/>
               </a:solidFill>
@@ -18988,6 +17499,535 @@
     <p:extLst>
       <p:ext uri="{BB962C8B-B14F-4D97-AF65-F5344CB8AC3E}">
         <p14:creationId xmlns:p14="http://schemas.microsoft.com/office/powerpoint/2010/main" val="1015852392"/>
+      </p:ext>
+    </p:extLst>
+  </p:cSld>
+  <p:clrMapOvr>
+    <a:masterClrMapping/>
+  </p:clrMapOvr>
+</p:sld>
+</file>
+
+<file path=ppt/slides/slide9.xml><?xml version="1.0" encoding="utf-8"?>
+<p:sld xmlns:a="http://schemas.openxmlformats.org/drawingml/2006/main" xmlns:r="http://schemas.openxmlformats.org/officeDocument/2006/relationships" xmlns:p="http://schemas.openxmlformats.org/presentationml/2006/main">
+  <p:cSld>
+    <p:spTree>
+      <p:nvGrpSpPr>
+        <p:cNvPr id="1" name=""/>
+        <p:cNvGrpSpPr/>
+        <p:nvPr/>
+      </p:nvGrpSpPr>
+      <p:grpSpPr>
+        <a:xfrm>
+          <a:off x="0" y="0"/>
+          <a:ext cx="0" cy="0"/>
+          <a:chOff x="0" y="0"/>
+          <a:chExt cx="0" cy="0"/>
+        </a:xfrm>
+      </p:grpSpPr>
+      <p:sp>
+        <p:nvSpPr>
+          <p:cNvPr id="2" name="Título 1">
+            <a:extLst>
+              <a:ext uri="{FF2B5EF4-FFF2-40B4-BE49-F238E27FC236}">
+                <a16:creationId xmlns:a16="http://schemas.microsoft.com/office/drawing/2014/main" id="{CB4476DA-A3D7-485A-8127-9B2490D09D86}"/>
+              </a:ext>
+            </a:extLst>
+          </p:cNvPr>
+          <p:cNvSpPr>
+            <a:spLocks noGrp="1"/>
+          </p:cNvSpPr>
+          <p:nvPr>
+            <p:ph type="title"/>
+          </p:nvPr>
+        </p:nvSpPr>
+        <p:spPr>
+          <a:xfrm>
+            <a:off x="457200" y="725954"/>
+            <a:ext cx="8229600" cy="1066800"/>
+          </a:xfrm>
+        </p:spPr>
+        <p:txBody>
+          <a:bodyPr vert="horz" lIns="91440" tIns="45720" rIns="91440" bIns="45720" anchor="ctr">
+            <a:normAutofit/>
+          </a:bodyPr>
+          <a:lstStyle/>
+          <a:p>
+            <a:r>
+              <a:rPr lang="es-ES"/>
+              <a:t>Estimación de Esfuerzos – Delphi</a:t>
+            </a:r>
+          </a:p>
+        </p:txBody>
+      </p:sp>
+      <p:pic>
+        <p:nvPicPr>
+          <p:cNvPr id="3" name="Picture 3" descr="Table&#10;&#10;Description automatically generated">
+            <a:extLst>
+              <a:ext uri="{FF2B5EF4-FFF2-40B4-BE49-F238E27FC236}">
+                <a16:creationId xmlns:a16="http://schemas.microsoft.com/office/drawing/2014/main" id="{3DA14B81-EA70-4208-A391-EA585D80F152}"/>
+              </a:ext>
+            </a:extLst>
+          </p:cNvPr>
+          <p:cNvPicPr>
+            <a:picLocks noChangeAspect="1"/>
+          </p:cNvPicPr>
+          <p:nvPr/>
+        </p:nvPicPr>
+        <p:blipFill>
+          <a:blip r:embed="rId2"/>
+          <a:stretch>
+            <a:fillRect/>
+          </a:stretch>
+        </p:blipFill>
+        <p:spPr>
+          <a:xfrm>
+            <a:off x="573771" y="1795297"/>
+            <a:ext cx="7390895" cy="1344745"/>
+          </a:xfrm>
+          <a:prstGeom prst="rect">
+            <a:avLst/>
+          </a:prstGeom>
+        </p:spPr>
+      </p:pic>
+      <p:sp>
+        <p:nvSpPr>
+          <p:cNvPr id="6" name="Arrow: Pentagon 5">
+            <a:extLst>
+              <a:ext uri="{FF2B5EF4-FFF2-40B4-BE49-F238E27FC236}">
+                <a16:creationId xmlns:a16="http://schemas.microsoft.com/office/drawing/2014/main" id="{EE69D3DE-39AC-40FA-AD23-BA18F0EDE0D4}"/>
+              </a:ext>
+            </a:extLst>
+          </p:cNvPr>
+          <p:cNvSpPr/>
+          <p:nvPr/>
+        </p:nvSpPr>
+        <p:spPr>
+          <a:xfrm>
+            <a:off x="697321" y="3283195"/>
+            <a:ext cx="2550932" cy="1173276"/>
+          </a:xfrm>
+          <a:prstGeom prst="homePlate">
+            <a:avLst/>
+          </a:prstGeom>
+        </p:spPr>
+        <p:style>
+          <a:lnRef idx="1">
+            <a:schemeClr val="accent2"/>
+          </a:lnRef>
+          <a:fillRef idx="2">
+            <a:schemeClr val="accent2"/>
+          </a:fillRef>
+          <a:effectRef idx="1">
+            <a:schemeClr val="accent2"/>
+          </a:effectRef>
+          <a:fontRef idx="minor">
+            <a:schemeClr val="dk1"/>
+          </a:fontRef>
+        </p:style>
+        <p:txBody>
+          <a:bodyPr rtlCol="0" anchor="ctr"/>
+          <a:lstStyle/>
+          <a:p>
+            <a:pPr algn="ctr"/>
+            <a:r>
+              <a:rPr lang="en-US"/>
+              <a:t>Se </a:t>
+            </a:r>
+            <a:r>
+              <a:rPr lang="en-US" err="1"/>
+              <a:t>escogen</a:t>
+            </a:r>
+            <a:r>
+              <a:rPr lang="en-US"/>
+              <a:t> el </a:t>
+            </a:r>
+            <a:r>
+              <a:rPr lang="en-US" err="1"/>
+              <a:t>módulo</a:t>
+            </a:r>
+            <a:r>
+              <a:rPr lang="en-US"/>
+              <a:t> con mayor y </a:t>
+            </a:r>
+            <a:r>
+              <a:rPr lang="en-US" err="1"/>
+              <a:t>menor</a:t>
+            </a:r>
+            <a:r>
+              <a:rPr lang="en-US"/>
+              <a:t> valor de PF </a:t>
+            </a:r>
+            <a:r>
+              <a:rPr lang="en-US" err="1"/>
+              <a:t>respectivamente</a:t>
+            </a:r>
+          </a:p>
+        </p:txBody>
+      </p:sp>
+      <p:sp>
+        <p:nvSpPr>
+          <p:cNvPr id="7" name="Arrow: Pentagon 6">
+            <a:extLst>
+              <a:ext uri="{FF2B5EF4-FFF2-40B4-BE49-F238E27FC236}">
+                <a16:creationId xmlns:a16="http://schemas.microsoft.com/office/drawing/2014/main" id="{5C292F65-4ABD-41C9-9CDF-4EA93FF8B12F}"/>
+              </a:ext>
+            </a:extLst>
+          </p:cNvPr>
+          <p:cNvSpPr/>
+          <p:nvPr/>
+        </p:nvSpPr>
+        <p:spPr>
+          <a:xfrm>
+            <a:off x="4671327" y="3283195"/>
+            <a:ext cx="2550932" cy="1173276"/>
+          </a:xfrm>
+          <a:prstGeom prst="homePlate">
+            <a:avLst/>
+          </a:prstGeom>
+        </p:spPr>
+        <p:style>
+          <a:lnRef idx="1">
+            <a:schemeClr val="accent2"/>
+          </a:lnRef>
+          <a:fillRef idx="2">
+            <a:schemeClr val="accent2"/>
+          </a:fillRef>
+          <a:effectRef idx="1">
+            <a:schemeClr val="accent2"/>
+          </a:effectRef>
+          <a:fontRef idx="minor">
+            <a:schemeClr val="dk1"/>
+          </a:fontRef>
+        </p:style>
+        <p:txBody>
+          <a:bodyPr lIns="91440" tIns="45720" rIns="91440" bIns="45720" rtlCol="0" anchor="ctr"/>
+          <a:lstStyle/>
+          <a:p>
+            <a:pPr algn="ctr"/>
+            <a:r>
+              <a:rPr lang="en-US"/>
+              <a:t>Como </a:t>
+            </a:r>
+            <a:r>
+              <a:rPr lang="en-US" err="1"/>
+              <a:t>grupo</a:t>
+            </a:r>
+            <a:r>
+              <a:rPr lang="en-US"/>
+              <a:t> de </a:t>
+            </a:r>
+            <a:r>
+              <a:rPr lang="en-US" err="1"/>
+              <a:t>expertos</a:t>
+            </a:r>
+            <a:r>
+              <a:rPr lang="en-US"/>
+              <a:t> </a:t>
+            </a:r>
+            <a:r>
+              <a:rPr lang="en-US" err="1"/>
+              <a:t>estimamos</a:t>
+            </a:r>
+            <a:r>
+              <a:rPr lang="en-US"/>
+              <a:t> en días la </a:t>
+            </a:r>
+            <a:r>
+              <a:rPr lang="en-US" err="1"/>
+              <a:t>duración</a:t>
+            </a:r>
+            <a:r>
+              <a:rPr lang="en-US"/>
+              <a:t> del desarrollo</a:t>
+            </a:r>
+          </a:p>
+        </p:txBody>
+      </p:sp>
+      <p:sp>
+        <p:nvSpPr>
+          <p:cNvPr id="8" name="Arrow: Right 7">
+            <a:extLst>
+              <a:ext uri="{FF2B5EF4-FFF2-40B4-BE49-F238E27FC236}">
+                <a16:creationId xmlns:a16="http://schemas.microsoft.com/office/drawing/2014/main" id="{D426F41F-0C26-4255-90E7-57572081BADD}"/>
+              </a:ext>
+            </a:extLst>
+          </p:cNvPr>
+          <p:cNvSpPr/>
+          <p:nvPr/>
+        </p:nvSpPr>
+        <p:spPr>
+          <a:xfrm>
+            <a:off x="3497103" y="3630448"/>
+            <a:ext cx="976470" cy="484450"/>
+          </a:xfrm>
+          <a:prstGeom prst="rightArrow">
+            <a:avLst/>
+          </a:prstGeom>
+        </p:spPr>
+        <p:style>
+          <a:lnRef idx="2">
+            <a:schemeClr val="accent2">
+              <a:shade val="50000"/>
+            </a:schemeClr>
+          </a:lnRef>
+          <a:fillRef idx="1">
+            <a:schemeClr val="accent2"/>
+          </a:fillRef>
+          <a:effectRef idx="0">
+            <a:schemeClr val="accent2"/>
+          </a:effectRef>
+          <a:fontRef idx="minor">
+            <a:schemeClr val="lt1"/>
+          </a:fontRef>
+        </p:style>
+        <p:txBody>
+          <a:bodyPr rtlCol="0" anchor="ctr"/>
+          <a:lstStyle/>
+          <a:p>
+            <a:pPr algn="ctr"/>
+            <a:endParaRPr lang="en-US"/>
+          </a:p>
+        </p:txBody>
+      </p:sp>
+      <p:sp>
+        <p:nvSpPr>
+          <p:cNvPr id="9" name="Arrow: Down 8">
+            <a:extLst>
+              <a:ext uri="{FF2B5EF4-FFF2-40B4-BE49-F238E27FC236}">
+                <a16:creationId xmlns:a16="http://schemas.microsoft.com/office/drawing/2014/main" id="{51550E1D-E0AB-4814-8CE3-7AD29631A4C3}"/>
+              </a:ext>
+            </a:extLst>
+          </p:cNvPr>
+          <p:cNvSpPr/>
+          <p:nvPr/>
+        </p:nvSpPr>
+        <p:spPr>
+          <a:xfrm>
+            <a:off x="5658137" y="4540753"/>
+            <a:ext cx="431464" cy="900775"/>
+          </a:xfrm>
+          <a:prstGeom prst="downArrow">
+            <a:avLst/>
+          </a:prstGeom>
+        </p:spPr>
+        <p:style>
+          <a:lnRef idx="2">
+            <a:schemeClr val="accent2">
+              <a:shade val="50000"/>
+            </a:schemeClr>
+          </a:lnRef>
+          <a:fillRef idx="1">
+            <a:schemeClr val="accent2"/>
+          </a:fillRef>
+          <a:effectRef idx="0">
+            <a:schemeClr val="accent2"/>
+          </a:effectRef>
+          <a:fontRef idx="minor">
+            <a:schemeClr val="lt1"/>
+          </a:fontRef>
+        </p:style>
+        <p:txBody>
+          <a:bodyPr rtlCol="0" anchor="ctr"/>
+          <a:lstStyle/>
+          <a:p>
+            <a:pPr algn="ctr"/>
+            <a:endParaRPr lang="en-US"/>
+          </a:p>
+        </p:txBody>
+      </p:sp>
+      <p:sp>
+        <p:nvSpPr>
+          <p:cNvPr id="11" name="Arrow: Pentagon 10">
+            <a:extLst>
+              <a:ext uri="{FF2B5EF4-FFF2-40B4-BE49-F238E27FC236}">
+                <a16:creationId xmlns:a16="http://schemas.microsoft.com/office/drawing/2014/main" id="{5A126C11-9D24-49B9-AD5B-1CA83C6A89A2}"/>
+              </a:ext>
+            </a:extLst>
+          </p:cNvPr>
+          <p:cNvSpPr/>
+          <p:nvPr/>
+        </p:nvSpPr>
+        <p:spPr>
+          <a:xfrm flipH="1">
+            <a:off x="4572922" y="5516208"/>
+            <a:ext cx="2550935" cy="1173276"/>
+          </a:xfrm>
+          <a:prstGeom prst="homePlate">
+            <a:avLst/>
+          </a:prstGeom>
+        </p:spPr>
+        <p:style>
+          <a:lnRef idx="1">
+            <a:schemeClr val="accent2"/>
+          </a:lnRef>
+          <a:fillRef idx="2">
+            <a:schemeClr val="accent2"/>
+          </a:fillRef>
+          <a:effectRef idx="1">
+            <a:schemeClr val="accent2"/>
+          </a:effectRef>
+          <a:fontRef idx="minor">
+            <a:schemeClr val="dk1"/>
+          </a:fontRef>
+        </p:style>
+        <p:txBody>
+          <a:bodyPr lIns="91440" tIns="45720" rIns="91440" bIns="45720" rtlCol="0" anchor="ctr"/>
+          <a:lstStyle/>
+          <a:p>
+            <a:pPr algn="ctr"/>
+            <a:r>
+              <a:rPr lang="en-US"/>
+              <a:t>Se </a:t>
+            </a:r>
+            <a:r>
+              <a:rPr lang="en-US" err="1"/>
+              <a:t>calcula</a:t>
+            </a:r>
+            <a:r>
+              <a:rPr lang="en-US"/>
+              <a:t> la media de las </a:t>
+            </a:r>
+            <a:r>
+              <a:rPr lang="en-US" err="1"/>
+              <a:t>estimaciones</a:t>
+            </a:r>
+            <a:r>
+              <a:rPr lang="en-US"/>
+              <a:t> y se </a:t>
+            </a:r>
+            <a:r>
+              <a:rPr lang="en-US" err="1"/>
+              <a:t>trunca</a:t>
+            </a:r>
+          </a:p>
+        </p:txBody>
+      </p:sp>
+      <p:sp>
+        <p:nvSpPr>
+          <p:cNvPr id="13" name="Arrow: Right 12">
+            <a:extLst>
+              <a:ext uri="{FF2B5EF4-FFF2-40B4-BE49-F238E27FC236}">
+                <a16:creationId xmlns:a16="http://schemas.microsoft.com/office/drawing/2014/main" id="{60349142-D779-46A1-A410-39C1B7209758}"/>
+              </a:ext>
+            </a:extLst>
+          </p:cNvPr>
+          <p:cNvSpPr/>
+          <p:nvPr/>
+        </p:nvSpPr>
+        <p:spPr>
+          <a:xfrm flipH="1">
+            <a:off x="3497103" y="5863461"/>
+            <a:ext cx="976470" cy="484450"/>
+          </a:xfrm>
+          <a:prstGeom prst="rightArrow">
+            <a:avLst/>
+          </a:prstGeom>
+        </p:spPr>
+        <p:style>
+          <a:lnRef idx="2">
+            <a:schemeClr val="accent2">
+              <a:shade val="50000"/>
+            </a:schemeClr>
+          </a:lnRef>
+          <a:fillRef idx="1">
+            <a:schemeClr val="accent2"/>
+          </a:fillRef>
+          <a:effectRef idx="0">
+            <a:schemeClr val="accent2"/>
+          </a:effectRef>
+          <a:fontRef idx="minor">
+            <a:schemeClr val="lt1"/>
+          </a:fontRef>
+        </p:style>
+        <p:txBody>
+          <a:bodyPr rtlCol="0" anchor="ctr"/>
+          <a:lstStyle/>
+          <a:p>
+            <a:pPr algn="ctr"/>
+            <a:endParaRPr lang="en-US"/>
+          </a:p>
+        </p:txBody>
+      </p:sp>
+      <p:sp>
+        <p:nvSpPr>
+          <p:cNvPr id="15" name="Arrow: Pentagon 14">
+            <a:extLst>
+              <a:ext uri="{FF2B5EF4-FFF2-40B4-BE49-F238E27FC236}">
+                <a16:creationId xmlns:a16="http://schemas.microsoft.com/office/drawing/2014/main" id="{A3C0F229-5284-46A6-B809-7B402F9C8710}"/>
+              </a:ext>
+            </a:extLst>
+          </p:cNvPr>
+          <p:cNvSpPr/>
+          <p:nvPr/>
+        </p:nvSpPr>
+        <p:spPr>
+          <a:xfrm flipH="1">
+            <a:off x="697319" y="5516207"/>
+            <a:ext cx="2550935" cy="1173276"/>
+          </a:xfrm>
+          <a:prstGeom prst="homePlate">
+            <a:avLst/>
+          </a:prstGeom>
+        </p:spPr>
+        <p:style>
+          <a:lnRef idx="1">
+            <a:schemeClr val="accent2"/>
+          </a:lnRef>
+          <a:fillRef idx="2">
+            <a:schemeClr val="accent2"/>
+          </a:fillRef>
+          <a:effectRef idx="1">
+            <a:schemeClr val="accent2"/>
+          </a:effectRef>
+          <a:fontRef idx="minor">
+            <a:schemeClr val="dk1"/>
+          </a:fontRef>
+        </p:style>
+        <p:txBody>
+          <a:bodyPr lIns="91440" tIns="45720" rIns="91440" bIns="45720" rtlCol="0" anchor="ctr"/>
+          <a:lstStyle/>
+          <a:p>
+            <a:pPr algn="ctr"/>
+            <a:r>
+              <a:rPr lang="en-US"/>
+              <a:t>La </a:t>
+            </a:r>
+            <a:r>
+              <a:rPr lang="en-US" err="1"/>
+              <a:t>duración</a:t>
+            </a:r>
+            <a:r>
+              <a:rPr lang="en-US"/>
+              <a:t> del resto de </a:t>
+            </a:r>
+            <a:r>
+              <a:rPr lang="en-US" err="1"/>
+              <a:t>módulos</a:t>
+            </a:r>
+            <a:r>
+              <a:rPr lang="en-US"/>
+              <a:t> se </a:t>
+            </a:r>
+            <a:r>
+              <a:rPr lang="en-US" err="1"/>
+              <a:t>obtiene</a:t>
+            </a:r>
+            <a:r>
+              <a:rPr lang="en-US"/>
+              <a:t> de forma </a:t>
+            </a:r>
+            <a:r>
+              <a:rPr lang="en-US" err="1"/>
+              <a:t>proporcional</a:t>
+            </a:r>
+          </a:p>
+        </p:txBody>
+      </p:sp>
+    </p:spTree>
+    <p:extLst>
+      <p:ext uri="{BB962C8B-B14F-4D97-AF65-F5344CB8AC3E}">
+        <p14:creationId xmlns:p14="http://schemas.microsoft.com/office/powerpoint/2010/main" val="2139188542"/>
       </p:ext>
     </p:extLst>
   </p:cSld>
@@ -19536,12 +18576,6 @@
 </file>
 
 <file path=customXml/item1.xml><?xml version="1.0" encoding="utf-8"?>
-<p:properties xmlns:p="http://schemas.microsoft.com/office/2006/metadata/properties" xmlns:xsi="http://www.w3.org/2001/XMLSchema-instance" xmlns:pc="http://schemas.microsoft.com/office/infopath/2007/PartnerControls">
-  <documentManagement/>
-</p:properties>
-</file>
-
-<file path=customXml/item2.xml><?xml version="1.0" encoding="utf-8"?>
 <ct:contentTypeSchema xmlns:ct="http://schemas.microsoft.com/office/2006/metadata/contentType" xmlns:ma="http://schemas.microsoft.com/office/2006/metadata/properties/metaAttributes" ct:_="" ma:_="" ma:contentTypeName="Documento" ma:contentTypeID="0x010100160AE6DB606576428B8651DA8CF48470" ma:contentTypeVersion="2" ma:contentTypeDescription="Crear nuevo documento." ma:contentTypeScope="" ma:versionID="086b7b7f4f560bd22be9a1714b717774">
   <xsd:schema xmlns:xsd="http://www.w3.org/2001/XMLSchema" xmlns:xs="http://www.w3.org/2001/XMLSchema" xmlns:p="http://schemas.microsoft.com/office/2006/metadata/properties" xmlns:ns2="8c6e9707-1289-4d3f-a3fb-39591d3243ff" targetNamespace="http://schemas.microsoft.com/office/2006/metadata/properties" ma:root="true" ma:fieldsID="5f82e149d16b4f660eaf1134f1a8e10f" ns2:_="">
     <xsd:import namespace="8c6e9707-1289-4d3f-a3fb-39591d3243ff"/>
@@ -19673,6 +18707,12 @@
 </ct:contentTypeSchema>
 </file>
 
+<file path=customXml/item2.xml><?xml version="1.0" encoding="utf-8"?>
+<p:properties xmlns:p="http://schemas.microsoft.com/office/2006/metadata/properties" xmlns:xsi="http://www.w3.org/2001/XMLSchema-instance" xmlns:pc="http://schemas.microsoft.com/office/infopath/2007/PartnerControls">
+  <documentManagement/>
+</p:properties>
+</file>
+
 <file path=customXml/item3.xml><?xml version="1.0" encoding="utf-8"?>
 <?mso-contentType ?>
 <FormTemplates xmlns="http://schemas.microsoft.com/sharepoint/v3/contenttype/forms">
@@ -19683,22 +18723,6 @@
 </file>
 
 <file path=customXml/itemProps1.xml><?xml version="1.0" encoding="utf-8"?>
-<ds:datastoreItem xmlns:ds="http://schemas.openxmlformats.org/officeDocument/2006/customXml" ds:itemID="{0025C892-7E62-4813-8333-6942B8FEF9AB}">
-  <ds:schemaRefs>
-    <ds:schemaRef ds:uri="http://schemas.microsoft.com/office/2006/documentManagement/types"/>
-    <ds:schemaRef ds:uri="http://purl.org/dc/elements/1.1/"/>
-    <ds:schemaRef ds:uri="http://schemas.openxmlformats.org/package/2006/metadata/core-properties"/>
-    <ds:schemaRef ds:uri="http://purl.org/dc/dcmitype/"/>
-    <ds:schemaRef ds:uri="http://www.w3.org/XML/1998/namespace"/>
-    <ds:schemaRef ds:uri="http://purl.org/dc/terms/"/>
-    <ds:schemaRef ds:uri="http://schemas.microsoft.com/office/2006/metadata/properties"/>
-    <ds:schemaRef ds:uri="http://schemas.microsoft.com/office/infopath/2007/PartnerControls"/>
-    <ds:schemaRef ds:uri="8c6e9707-1289-4d3f-a3fb-39591d3243ff"/>
-  </ds:schemaRefs>
-</ds:datastoreItem>
-</file>
-
-<file path=customXml/itemProps2.xml><?xml version="1.0" encoding="utf-8"?>
 <ds:datastoreItem xmlns:ds="http://schemas.openxmlformats.org/officeDocument/2006/customXml" ds:itemID="{8DB68B1F-8356-4055-82A4-49AE7D9F9F51}">
   <ds:schemaRefs>
     <ds:schemaRef ds:uri="http://schemas.microsoft.com/office/2006/metadata/contentType"/>
@@ -19716,6 +18740,22 @@
 </ds:datastoreItem>
 </file>
 
+<file path=customXml/itemProps2.xml><?xml version="1.0" encoding="utf-8"?>
+<ds:datastoreItem xmlns:ds="http://schemas.openxmlformats.org/officeDocument/2006/customXml" ds:itemID="{0025C892-7E62-4813-8333-6942B8FEF9AB}">
+  <ds:schemaRefs>
+    <ds:schemaRef ds:uri="http://schemas.microsoft.com/office/2006/documentManagement/types"/>
+    <ds:schemaRef ds:uri="http://purl.org/dc/elements/1.1/"/>
+    <ds:schemaRef ds:uri="http://schemas.openxmlformats.org/package/2006/metadata/core-properties"/>
+    <ds:schemaRef ds:uri="http://purl.org/dc/dcmitype/"/>
+    <ds:schemaRef ds:uri="http://www.w3.org/XML/1998/namespace"/>
+    <ds:schemaRef ds:uri="http://purl.org/dc/terms/"/>
+    <ds:schemaRef ds:uri="http://schemas.microsoft.com/office/2006/metadata/properties"/>
+    <ds:schemaRef ds:uri="http://schemas.microsoft.com/office/infopath/2007/PartnerControls"/>
+    <ds:schemaRef ds:uri="8c6e9707-1289-4d3f-a3fb-39591d3243ff"/>
+  </ds:schemaRefs>
+</ds:datastoreItem>
+</file>
+
 <file path=customXml/itemProps3.xml><?xml version="1.0" encoding="utf-8"?>
 <ds:datastoreItem xmlns:ds="http://schemas.openxmlformats.org/officeDocument/2006/customXml" ds:itemID="{3EC205AB-C9C8-4A3D-8187-9100A5EE417A}">
   <ds:schemaRefs>

</xml_diff>